<commit_message>
Add appx icons and tiles (png)
</commit_message>
<xml_diff>
--- a/icon-draft.pptx
+++ b/icon-draft.pptx
@@ -6,6 +6,8 @@
   </p:sldMasterIdLst>
   <p:sldIdLst>
     <p:sldId id="256" r:id="rId2"/>
+    <p:sldId id="257" r:id="rId3"/>
+    <p:sldId id="258" r:id="rId4"/>
   </p:sldIdLst>
   <p:sldSz cx="12192000" cy="6858000"/>
   <p:notesSz cx="6858000" cy="9144000"/>
@@ -259,7 +261,7 @@
           <a:p>
             <a:fld id="{28D94BAB-CBDE-4079-B265-28A563588663}" type="datetimeFigureOut">
               <a:rPr lang="ko-KR" altLang="en-US" smtClean="0"/>
-              <a:t>2020-10-08</a:t>
+              <a:t>2021-03-17</a:t>
             </a:fld>
             <a:endParaRPr lang="ko-KR" altLang="en-US"/>
           </a:p>
@@ -457,7 +459,7 @@
           <a:p>
             <a:fld id="{28D94BAB-CBDE-4079-B265-28A563588663}" type="datetimeFigureOut">
               <a:rPr lang="ko-KR" altLang="en-US" smtClean="0"/>
-              <a:t>2020-10-08</a:t>
+              <a:t>2021-03-17</a:t>
             </a:fld>
             <a:endParaRPr lang="ko-KR" altLang="en-US"/>
           </a:p>
@@ -665,7 +667,7 @@
           <a:p>
             <a:fld id="{28D94BAB-CBDE-4079-B265-28A563588663}" type="datetimeFigureOut">
               <a:rPr lang="ko-KR" altLang="en-US" smtClean="0"/>
-              <a:t>2020-10-08</a:t>
+              <a:t>2021-03-17</a:t>
             </a:fld>
             <a:endParaRPr lang="ko-KR" altLang="en-US"/>
           </a:p>
@@ -863,7 +865,7 @@
           <a:p>
             <a:fld id="{28D94BAB-CBDE-4079-B265-28A563588663}" type="datetimeFigureOut">
               <a:rPr lang="ko-KR" altLang="en-US" smtClean="0"/>
-              <a:t>2020-10-08</a:t>
+              <a:t>2021-03-17</a:t>
             </a:fld>
             <a:endParaRPr lang="ko-KR" altLang="en-US"/>
           </a:p>
@@ -1138,7 +1140,7 @@
           <a:p>
             <a:fld id="{28D94BAB-CBDE-4079-B265-28A563588663}" type="datetimeFigureOut">
               <a:rPr lang="ko-KR" altLang="en-US" smtClean="0"/>
-              <a:t>2020-10-08</a:t>
+              <a:t>2021-03-17</a:t>
             </a:fld>
             <a:endParaRPr lang="ko-KR" altLang="en-US"/>
           </a:p>
@@ -1403,7 +1405,7 @@
           <a:p>
             <a:fld id="{28D94BAB-CBDE-4079-B265-28A563588663}" type="datetimeFigureOut">
               <a:rPr lang="ko-KR" altLang="en-US" smtClean="0"/>
-              <a:t>2020-10-08</a:t>
+              <a:t>2021-03-17</a:t>
             </a:fld>
             <a:endParaRPr lang="ko-KR" altLang="en-US"/>
           </a:p>
@@ -1815,7 +1817,7 @@
           <a:p>
             <a:fld id="{28D94BAB-CBDE-4079-B265-28A563588663}" type="datetimeFigureOut">
               <a:rPr lang="ko-KR" altLang="en-US" smtClean="0"/>
-              <a:t>2020-10-08</a:t>
+              <a:t>2021-03-17</a:t>
             </a:fld>
             <a:endParaRPr lang="ko-KR" altLang="en-US"/>
           </a:p>
@@ -1956,7 +1958,7 @@
           <a:p>
             <a:fld id="{28D94BAB-CBDE-4079-B265-28A563588663}" type="datetimeFigureOut">
               <a:rPr lang="ko-KR" altLang="en-US" smtClean="0"/>
-              <a:t>2020-10-08</a:t>
+              <a:t>2021-03-17</a:t>
             </a:fld>
             <a:endParaRPr lang="ko-KR" altLang="en-US"/>
           </a:p>
@@ -2069,7 +2071,7 @@
           <a:p>
             <a:fld id="{28D94BAB-CBDE-4079-B265-28A563588663}" type="datetimeFigureOut">
               <a:rPr lang="ko-KR" altLang="en-US" smtClean="0"/>
-              <a:t>2020-10-08</a:t>
+              <a:t>2021-03-17</a:t>
             </a:fld>
             <a:endParaRPr lang="ko-KR" altLang="en-US"/>
           </a:p>
@@ -2380,7 +2382,7 @@
           <a:p>
             <a:fld id="{28D94BAB-CBDE-4079-B265-28A563588663}" type="datetimeFigureOut">
               <a:rPr lang="ko-KR" altLang="en-US" smtClean="0"/>
-              <a:t>2020-10-08</a:t>
+              <a:t>2021-03-17</a:t>
             </a:fld>
             <a:endParaRPr lang="ko-KR" altLang="en-US"/>
           </a:p>
@@ -2668,7 +2670,7 @@
           <a:p>
             <a:fld id="{28D94BAB-CBDE-4079-B265-28A563588663}" type="datetimeFigureOut">
               <a:rPr lang="ko-KR" altLang="en-US" smtClean="0"/>
-              <a:t>2020-10-08</a:t>
+              <a:t>2021-03-17</a:t>
             </a:fld>
             <a:endParaRPr lang="ko-KR" altLang="en-US"/>
           </a:p>
@@ -2909,7 +2911,7 @@
           <a:p>
             <a:fld id="{28D94BAB-CBDE-4079-B265-28A563588663}" type="datetimeFigureOut">
               <a:rPr lang="ko-KR" altLang="en-US" smtClean="0"/>
-              <a:t>2020-10-08</a:t>
+              <a:t>2021-03-17</a:t>
             </a:fld>
             <a:endParaRPr lang="ko-KR" altLang="en-US"/>
           </a:p>
@@ -3340,7 +3342,7 @@
         </p:nvGrpSpPr>
         <p:grpSpPr>
           <a:xfrm>
-            <a:off x="6566104" y="747558"/>
+            <a:off x="9204529" y="747558"/>
             <a:ext cx="2324715" cy="2324715"/>
             <a:chOff x="9407627" y="187119"/>
             <a:chExt cx="2324715" cy="2324715"/>
@@ -3685,7 +3687,7 @@
         </p:nvGrpSpPr>
         <p:grpSpPr>
           <a:xfrm>
-            <a:off x="6566104" y="3490949"/>
+            <a:off x="9204529" y="3490949"/>
             <a:ext cx="2324715" cy="2324715"/>
             <a:chOff x="9407627" y="2930510"/>
             <a:chExt cx="2324715" cy="2324715"/>
@@ -4018,7 +4020,7 @@
         </p:nvGrpSpPr>
         <p:grpSpPr>
           <a:xfrm>
-            <a:off x="3518871" y="3490949"/>
+            <a:off x="6157296" y="3490949"/>
             <a:ext cx="2324715" cy="2324715"/>
             <a:chOff x="3518871" y="3490949"/>
             <a:chExt cx="2324715" cy="2324715"/>
@@ -4342,7 +4344,7 @@
         </p:nvGrpSpPr>
         <p:grpSpPr>
           <a:xfrm>
-            <a:off x="3518870" y="747557"/>
+            <a:off x="6157295" y="747557"/>
             <a:ext cx="2324715" cy="2324715"/>
             <a:chOff x="3518870" y="747557"/>
             <a:chExt cx="2324715" cy="2324715"/>
@@ -4669,7 +4671,7 @@
         </p:nvGrpSpPr>
         <p:grpSpPr>
           <a:xfrm>
-            <a:off x="832895" y="808517"/>
+            <a:off x="3471320" y="808517"/>
             <a:ext cx="2324715" cy="2324715"/>
             <a:chOff x="832895" y="808517"/>
             <a:chExt cx="2324715" cy="2324715"/>
@@ -4981,10 +4983,3581 @@
           </p:txBody>
         </p:sp>
       </p:grpSp>
+      <p:sp>
+        <p:nvSpPr>
+          <p:cNvPr id="36" name="직사각형 35">
+            <a:extLst>
+              <a:ext uri="{FF2B5EF4-FFF2-40B4-BE49-F238E27FC236}">
+                <a16:creationId xmlns:a16="http://schemas.microsoft.com/office/drawing/2014/main" id="{560AECCF-248F-497D-A5D0-1CC4ADC8C24E}"/>
+              </a:ext>
+            </a:extLst>
+          </p:cNvPr>
+          <p:cNvSpPr/>
+          <p:nvPr/>
+        </p:nvSpPr>
+        <p:spPr>
+          <a:xfrm>
+            <a:off x="0" y="0"/>
+            <a:ext cx="3297270" cy="6858000"/>
+          </a:xfrm>
+          <a:prstGeom prst="rect">
+            <a:avLst/>
+          </a:prstGeom>
+          <a:solidFill>
+            <a:schemeClr val="bg2">
+              <a:lumMod val="90000"/>
+            </a:schemeClr>
+          </a:solidFill>
+          <a:ln>
+            <a:noFill/>
+          </a:ln>
+        </p:spPr>
+        <p:style>
+          <a:lnRef idx="2">
+            <a:schemeClr val="accent1">
+              <a:shade val="50000"/>
+            </a:schemeClr>
+          </a:lnRef>
+          <a:fillRef idx="1">
+            <a:schemeClr val="accent1"/>
+          </a:fillRef>
+          <a:effectRef idx="0">
+            <a:schemeClr val="accent1"/>
+          </a:effectRef>
+          <a:fontRef idx="minor">
+            <a:schemeClr val="lt1"/>
+          </a:fontRef>
+        </p:style>
+        <p:txBody>
+          <a:bodyPr rtlCol="0" anchor="ctr"/>
+          <a:lstStyle/>
+          <a:p>
+            <a:pPr algn="ctr"/>
+            <a:endParaRPr lang="ko-KR" altLang="en-US"/>
+          </a:p>
+        </p:txBody>
+      </p:sp>
+      <p:sp>
+        <p:nvSpPr>
+          <p:cNvPr id="37" name="TextBox 36">
+            <a:extLst>
+              <a:ext uri="{FF2B5EF4-FFF2-40B4-BE49-F238E27FC236}">
+                <a16:creationId xmlns:a16="http://schemas.microsoft.com/office/drawing/2014/main" id="{AAA4CDFA-57FE-48A0-9302-F58A70E38F0E}"/>
+              </a:ext>
+            </a:extLst>
+          </p:cNvPr>
+          <p:cNvSpPr txBox="1"/>
+          <p:nvPr/>
+        </p:nvSpPr>
+        <p:spPr>
+          <a:xfrm>
+            <a:off x="322246" y="690450"/>
+            <a:ext cx="2652777" cy="523220"/>
+          </a:xfrm>
+          <a:prstGeom prst="rect">
+            <a:avLst/>
+          </a:prstGeom>
+          <a:noFill/>
+        </p:spPr>
+        <p:txBody>
+          <a:bodyPr wrap="none" rtlCol="0">
+            <a:spAutoFit/>
+          </a:bodyPr>
+          <a:lstStyle/>
+          <a:p>
+            <a:pPr algn="ctr"/>
+            <a:r>
+              <a:rPr lang="en-US" altLang="ko-KR" sz="2800" dirty="0"/>
+              <a:t>Basic resources</a:t>
+            </a:r>
+            <a:endParaRPr lang="ko-KR" altLang="en-US" sz="2800" dirty="0"/>
+          </a:p>
+        </p:txBody>
+      </p:sp>
+      <p:sp>
+        <p:nvSpPr>
+          <p:cNvPr id="38" name="TextBox 37">
+            <a:extLst>
+              <a:ext uri="{FF2B5EF4-FFF2-40B4-BE49-F238E27FC236}">
+                <a16:creationId xmlns:a16="http://schemas.microsoft.com/office/drawing/2014/main" id="{96A25771-6A51-4584-8D49-238F4A531913}"/>
+              </a:ext>
+            </a:extLst>
+          </p:cNvPr>
+          <p:cNvSpPr txBox="1"/>
+          <p:nvPr/>
+        </p:nvSpPr>
+        <p:spPr>
+          <a:xfrm>
+            <a:off x="921527" y="1365865"/>
+            <a:ext cx="1454244" cy="276999"/>
+          </a:xfrm>
+          <a:prstGeom prst="rect">
+            <a:avLst/>
+          </a:prstGeom>
+          <a:noFill/>
+        </p:spPr>
+        <p:txBody>
+          <a:bodyPr wrap="none" rtlCol="0">
+            <a:spAutoFit/>
+          </a:bodyPr>
+          <a:lstStyle/>
+          <a:p>
+            <a:pPr algn="ctr"/>
+            <a:r>
+              <a:rPr lang="en-US" altLang="ko-KR" sz="1200" dirty="0"/>
+              <a:t>Basic icons, logos.</a:t>
+            </a:r>
+            <a:endParaRPr lang="ko-KR" altLang="en-US" sz="1200" dirty="0"/>
+          </a:p>
+        </p:txBody>
+      </p:sp>
     </p:spTree>
     <p:extLst>
       <p:ext uri="{BB962C8B-B14F-4D97-AF65-F5344CB8AC3E}">
         <p14:creationId xmlns:p14="http://schemas.microsoft.com/office/powerpoint/2010/main" val="2521928952"/>
+      </p:ext>
+    </p:extLst>
+  </p:cSld>
+  <p:clrMapOvr>
+    <a:masterClrMapping/>
+  </p:clrMapOvr>
+</p:sld>
+</file>
+
+<file path=ppt/slides/slide2.xml><?xml version="1.0" encoding="utf-8"?>
+<p:sld xmlns:a="http://schemas.openxmlformats.org/drawingml/2006/main" xmlns:r="http://schemas.openxmlformats.org/officeDocument/2006/relationships" xmlns:p="http://schemas.openxmlformats.org/presentationml/2006/main">
+  <p:cSld>
+    <p:spTree>
+      <p:nvGrpSpPr>
+        <p:cNvPr id="1" name=""/>
+        <p:cNvGrpSpPr/>
+        <p:nvPr/>
+      </p:nvGrpSpPr>
+      <p:grpSpPr>
+        <a:xfrm>
+          <a:off x="0" y="0"/>
+          <a:ext cx="0" cy="0"/>
+          <a:chOff x="0" y="0"/>
+          <a:chExt cx="0" cy="0"/>
+        </a:xfrm>
+      </p:grpSpPr>
+      <p:sp>
+        <p:nvSpPr>
+          <p:cNvPr id="4" name="직사각형 3">
+            <a:extLst>
+              <a:ext uri="{FF2B5EF4-FFF2-40B4-BE49-F238E27FC236}">
+                <a16:creationId xmlns:a16="http://schemas.microsoft.com/office/drawing/2014/main" id="{7E319260-BACD-46E4-B9C9-57B762089E0A}"/>
+              </a:ext>
+            </a:extLst>
+          </p:cNvPr>
+          <p:cNvSpPr/>
+          <p:nvPr/>
+        </p:nvSpPr>
+        <p:spPr>
+          <a:xfrm>
+            <a:off x="6489598" y="928489"/>
+            <a:ext cx="1428750" cy="1428750"/>
+          </a:xfrm>
+          <a:prstGeom prst="rect">
+            <a:avLst/>
+          </a:prstGeom>
+          <a:solidFill>
+            <a:srgbClr val="2F71E9"/>
+          </a:solidFill>
+          <a:ln>
+            <a:noFill/>
+          </a:ln>
+        </p:spPr>
+        <p:style>
+          <a:lnRef idx="2">
+            <a:schemeClr val="accent1">
+              <a:shade val="50000"/>
+            </a:schemeClr>
+          </a:lnRef>
+          <a:fillRef idx="1">
+            <a:schemeClr val="accent1"/>
+          </a:fillRef>
+          <a:effectRef idx="0">
+            <a:schemeClr val="accent1"/>
+          </a:effectRef>
+          <a:fontRef idx="minor">
+            <a:schemeClr val="lt1"/>
+          </a:fontRef>
+        </p:style>
+        <p:txBody>
+          <a:bodyPr rtlCol="0" anchor="ctr"/>
+          <a:lstStyle/>
+          <a:p>
+            <a:pPr algn="ctr"/>
+            <a:endParaRPr lang="ko-KR" altLang="en-US" dirty="0"/>
+          </a:p>
+        </p:txBody>
+      </p:sp>
+      <p:sp>
+        <p:nvSpPr>
+          <p:cNvPr id="11" name="TextBox 10">
+            <a:extLst>
+              <a:ext uri="{FF2B5EF4-FFF2-40B4-BE49-F238E27FC236}">
+                <a16:creationId xmlns:a16="http://schemas.microsoft.com/office/drawing/2014/main" id="{56539597-4F77-4E2E-BD5C-ECB78B798022}"/>
+              </a:ext>
+            </a:extLst>
+          </p:cNvPr>
+          <p:cNvSpPr txBox="1"/>
+          <p:nvPr/>
+        </p:nvSpPr>
+        <p:spPr>
+          <a:xfrm>
+            <a:off x="6029645" y="438835"/>
+            <a:ext cx="2348656" cy="369332"/>
+          </a:xfrm>
+          <a:prstGeom prst="rect">
+            <a:avLst/>
+          </a:prstGeom>
+          <a:noFill/>
+        </p:spPr>
+        <p:txBody>
+          <a:bodyPr wrap="none" rtlCol="0">
+            <a:spAutoFit/>
+          </a:bodyPr>
+          <a:lstStyle/>
+          <a:p>
+            <a:pPr algn="ctr"/>
+            <a:r>
+              <a:rPr lang="en-US" altLang="ko-KR" dirty="0"/>
+              <a:t>Square150x150Logo</a:t>
+            </a:r>
+            <a:endParaRPr lang="ko-KR" altLang="en-US" dirty="0"/>
+          </a:p>
+        </p:txBody>
+      </p:sp>
+      <p:sp>
+        <p:nvSpPr>
+          <p:cNvPr id="12" name="TextBox 11">
+            <a:extLst>
+              <a:ext uri="{FF2B5EF4-FFF2-40B4-BE49-F238E27FC236}">
+                <a16:creationId xmlns:a16="http://schemas.microsoft.com/office/drawing/2014/main" id="{90733E3E-35E5-4B9D-9471-048FC09CE441}"/>
+              </a:ext>
+            </a:extLst>
+          </p:cNvPr>
+          <p:cNvSpPr txBox="1"/>
+          <p:nvPr/>
+        </p:nvSpPr>
+        <p:spPr>
+          <a:xfrm>
+            <a:off x="3599314" y="443341"/>
+            <a:ext cx="2044086" cy="369332"/>
+          </a:xfrm>
+          <a:prstGeom prst="rect">
+            <a:avLst/>
+          </a:prstGeom>
+          <a:noFill/>
+        </p:spPr>
+        <p:txBody>
+          <a:bodyPr wrap="none" rtlCol="0">
+            <a:spAutoFit/>
+          </a:bodyPr>
+          <a:lstStyle/>
+          <a:p>
+            <a:pPr algn="ctr"/>
+            <a:r>
+              <a:rPr lang="en-US" altLang="ko-KR" dirty="0"/>
+              <a:t>Square44x44Logo</a:t>
+            </a:r>
+            <a:endParaRPr lang="ko-KR" altLang="en-US" dirty="0"/>
+          </a:p>
+        </p:txBody>
+      </p:sp>
+      <p:sp>
+        <p:nvSpPr>
+          <p:cNvPr id="13" name="TextBox 12">
+            <a:extLst>
+              <a:ext uri="{FF2B5EF4-FFF2-40B4-BE49-F238E27FC236}">
+                <a16:creationId xmlns:a16="http://schemas.microsoft.com/office/drawing/2014/main" id="{A039A7B8-CE1A-4490-AEDF-BC3C0AFB2FDB}"/>
+              </a:ext>
+            </a:extLst>
+          </p:cNvPr>
+          <p:cNvSpPr txBox="1"/>
+          <p:nvPr/>
+        </p:nvSpPr>
+        <p:spPr>
+          <a:xfrm>
+            <a:off x="9159840" y="438835"/>
+            <a:ext cx="2116285" cy="369332"/>
+          </a:xfrm>
+          <a:prstGeom prst="rect">
+            <a:avLst/>
+          </a:prstGeom>
+          <a:noFill/>
+        </p:spPr>
+        <p:txBody>
+          <a:bodyPr wrap="none" rtlCol="0">
+            <a:spAutoFit/>
+          </a:bodyPr>
+          <a:lstStyle/>
+          <a:p>
+            <a:pPr algn="ctr"/>
+            <a:r>
+              <a:rPr lang="en-US" altLang="ko-KR" dirty="0"/>
+              <a:t>Wide310x150Logo</a:t>
+            </a:r>
+            <a:endParaRPr lang="ko-KR" altLang="en-US" dirty="0"/>
+          </a:p>
+        </p:txBody>
+      </p:sp>
+      <p:sp>
+        <p:nvSpPr>
+          <p:cNvPr id="14" name="TextBox 13">
+            <a:extLst>
+              <a:ext uri="{FF2B5EF4-FFF2-40B4-BE49-F238E27FC236}">
+                <a16:creationId xmlns:a16="http://schemas.microsoft.com/office/drawing/2014/main" id="{D1826C35-CC27-40AE-8108-0CD29FB5E2EB}"/>
+              </a:ext>
+            </a:extLst>
+          </p:cNvPr>
+          <p:cNvSpPr txBox="1"/>
+          <p:nvPr/>
+        </p:nvSpPr>
+        <p:spPr>
+          <a:xfrm>
+            <a:off x="9660010" y="3008140"/>
+            <a:ext cx="1115947" cy="369332"/>
+          </a:xfrm>
+          <a:prstGeom prst="rect">
+            <a:avLst/>
+          </a:prstGeom>
+          <a:noFill/>
+        </p:spPr>
+        <p:txBody>
+          <a:bodyPr wrap="none" rtlCol="0">
+            <a:spAutoFit/>
+          </a:bodyPr>
+          <a:lstStyle/>
+          <a:p>
+            <a:pPr algn="ctr"/>
+            <a:r>
+              <a:rPr lang="en-US" altLang="ko-KR" dirty="0" err="1"/>
+              <a:t>LargeTile</a:t>
+            </a:r>
+            <a:endParaRPr lang="ko-KR" altLang="en-US" dirty="0"/>
+          </a:p>
+        </p:txBody>
+      </p:sp>
+      <p:sp>
+        <p:nvSpPr>
+          <p:cNvPr id="15" name="TextBox 14">
+            <a:extLst>
+              <a:ext uri="{FF2B5EF4-FFF2-40B4-BE49-F238E27FC236}">
+                <a16:creationId xmlns:a16="http://schemas.microsoft.com/office/drawing/2014/main" id="{80166F47-BC5A-4655-9A05-A74B9D9AF74E}"/>
+              </a:ext>
+            </a:extLst>
+          </p:cNvPr>
+          <p:cNvSpPr txBox="1"/>
+          <p:nvPr/>
+        </p:nvSpPr>
+        <p:spPr>
+          <a:xfrm>
+            <a:off x="6735141" y="3008140"/>
+            <a:ext cx="1104790" cy="369332"/>
+          </a:xfrm>
+          <a:prstGeom prst="rect">
+            <a:avLst/>
+          </a:prstGeom>
+          <a:noFill/>
+        </p:spPr>
+        <p:txBody>
+          <a:bodyPr wrap="none" rtlCol="0">
+            <a:spAutoFit/>
+          </a:bodyPr>
+          <a:lstStyle/>
+          <a:p>
+            <a:pPr algn="ctr"/>
+            <a:r>
+              <a:rPr lang="en-US" altLang="ko-KR" dirty="0" err="1"/>
+              <a:t>SmallTile</a:t>
+            </a:r>
+            <a:endParaRPr lang="ko-KR" altLang="en-US" dirty="0"/>
+          </a:p>
+        </p:txBody>
+      </p:sp>
+      <p:sp>
+        <p:nvSpPr>
+          <p:cNvPr id="16" name="직사각형 15">
+            <a:extLst>
+              <a:ext uri="{FF2B5EF4-FFF2-40B4-BE49-F238E27FC236}">
+                <a16:creationId xmlns:a16="http://schemas.microsoft.com/office/drawing/2014/main" id="{0CB5A637-5EC9-4CAA-BE8D-0B0EC06743E2}"/>
+              </a:ext>
+            </a:extLst>
+          </p:cNvPr>
+          <p:cNvSpPr/>
+          <p:nvPr/>
+        </p:nvSpPr>
+        <p:spPr>
+          <a:xfrm>
+            <a:off x="4411807" y="1365584"/>
+            <a:ext cx="419100" cy="419100"/>
+          </a:xfrm>
+          <a:prstGeom prst="rect">
+            <a:avLst/>
+          </a:prstGeom>
+          <a:solidFill>
+            <a:srgbClr val="2F71E9"/>
+          </a:solidFill>
+          <a:ln>
+            <a:noFill/>
+          </a:ln>
+        </p:spPr>
+        <p:style>
+          <a:lnRef idx="2">
+            <a:schemeClr val="accent1">
+              <a:shade val="50000"/>
+            </a:schemeClr>
+          </a:lnRef>
+          <a:fillRef idx="1">
+            <a:schemeClr val="accent1"/>
+          </a:fillRef>
+          <a:effectRef idx="0">
+            <a:schemeClr val="accent1"/>
+          </a:effectRef>
+          <a:fontRef idx="minor">
+            <a:schemeClr val="lt1"/>
+          </a:fontRef>
+        </p:style>
+        <p:txBody>
+          <a:bodyPr rtlCol="0" anchor="ctr"/>
+          <a:lstStyle/>
+          <a:p>
+            <a:pPr algn="ctr"/>
+            <a:endParaRPr lang="ko-KR" altLang="en-US" dirty="0"/>
+          </a:p>
+        </p:txBody>
+      </p:sp>
+      <p:sp>
+        <p:nvSpPr>
+          <p:cNvPr id="17" name="직사각형 16">
+            <a:extLst>
+              <a:ext uri="{FF2B5EF4-FFF2-40B4-BE49-F238E27FC236}">
+                <a16:creationId xmlns:a16="http://schemas.microsoft.com/office/drawing/2014/main" id="{E6FC29D9-EB4F-4864-88DD-48FDE4D07A27}"/>
+              </a:ext>
+            </a:extLst>
+          </p:cNvPr>
+          <p:cNvSpPr/>
+          <p:nvPr/>
+        </p:nvSpPr>
+        <p:spPr>
+          <a:xfrm>
+            <a:off x="8741608" y="928489"/>
+            <a:ext cx="2952750" cy="1428750"/>
+          </a:xfrm>
+          <a:prstGeom prst="rect">
+            <a:avLst/>
+          </a:prstGeom>
+          <a:solidFill>
+            <a:srgbClr val="2F71E9"/>
+          </a:solidFill>
+          <a:ln>
+            <a:noFill/>
+          </a:ln>
+        </p:spPr>
+        <p:style>
+          <a:lnRef idx="2">
+            <a:schemeClr val="accent1">
+              <a:shade val="50000"/>
+            </a:schemeClr>
+          </a:lnRef>
+          <a:fillRef idx="1">
+            <a:schemeClr val="accent1"/>
+          </a:fillRef>
+          <a:effectRef idx="0">
+            <a:schemeClr val="accent1"/>
+          </a:effectRef>
+          <a:fontRef idx="minor">
+            <a:schemeClr val="lt1"/>
+          </a:fontRef>
+        </p:style>
+        <p:txBody>
+          <a:bodyPr rtlCol="0" anchor="ctr"/>
+          <a:lstStyle/>
+          <a:p>
+            <a:pPr algn="ctr"/>
+            <a:endParaRPr lang="ko-KR" altLang="en-US" dirty="0"/>
+          </a:p>
+        </p:txBody>
+      </p:sp>
+      <p:sp>
+        <p:nvSpPr>
+          <p:cNvPr id="18" name="직사각형 17">
+            <a:extLst>
+              <a:ext uri="{FF2B5EF4-FFF2-40B4-BE49-F238E27FC236}">
+                <a16:creationId xmlns:a16="http://schemas.microsoft.com/office/drawing/2014/main" id="{85A2154B-DD60-47D6-A4DE-C00F76AC088B}"/>
+              </a:ext>
+            </a:extLst>
+          </p:cNvPr>
+          <p:cNvSpPr/>
+          <p:nvPr/>
+        </p:nvSpPr>
+        <p:spPr>
+          <a:xfrm>
+            <a:off x="8741608" y="3584739"/>
+            <a:ext cx="2952750" cy="2952750"/>
+          </a:xfrm>
+          <a:prstGeom prst="rect">
+            <a:avLst/>
+          </a:prstGeom>
+          <a:solidFill>
+            <a:srgbClr val="2F71E9"/>
+          </a:solidFill>
+          <a:ln>
+            <a:noFill/>
+          </a:ln>
+        </p:spPr>
+        <p:style>
+          <a:lnRef idx="2">
+            <a:schemeClr val="accent1">
+              <a:shade val="50000"/>
+            </a:schemeClr>
+          </a:lnRef>
+          <a:fillRef idx="1">
+            <a:schemeClr val="accent1"/>
+          </a:fillRef>
+          <a:effectRef idx="0">
+            <a:schemeClr val="accent1"/>
+          </a:effectRef>
+          <a:fontRef idx="minor">
+            <a:schemeClr val="lt1"/>
+          </a:fontRef>
+        </p:style>
+        <p:txBody>
+          <a:bodyPr rtlCol="0" anchor="ctr"/>
+          <a:lstStyle/>
+          <a:p>
+            <a:pPr algn="ctr"/>
+            <a:endParaRPr lang="ko-KR" altLang="en-US" dirty="0"/>
+          </a:p>
+        </p:txBody>
+      </p:sp>
+      <p:sp>
+        <p:nvSpPr>
+          <p:cNvPr id="19" name="직사각형 18">
+            <a:extLst>
+              <a:ext uri="{FF2B5EF4-FFF2-40B4-BE49-F238E27FC236}">
+                <a16:creationId xmlns:a16="http://schemas.microsoft.com/office/drawing/2014/main" id="{A36A47B8-790B-44C1-887B-40FA63D93CB1}"/>
+              </a:ext>
+            </a:extLst>
+          </p:cNvPr>
+          <p:cNvSpPr/>
+          <p:nvPr/>
+        </p:nvSpPr>
+        <p:spPr>
+          <a:xfrm>
+            <a:off x="6949398" y="3848691"/>
+            <a:ext cx="676275" cy="676275"/>
+          </a:xfrm>
+          <a:prstGeom prst="rect">
+            <a:avLst/>
+          </a:prstGeom>
+          <a:solidFill>
+            <a:srgbClr val="2F71E9"/>
+          </a:solidFill>
+          <a:ln>
+            <a:noFill/>
+          </a:ln>
+        </p:spPr>
+        <p:style>
+          <a:lnRef idx="2">
+            <a:schemeClr val="accent1">
+              <a:shade val="50000"/>
+            </a:schemeClr>
+          </a:lnRef>
+          <a:fillRef idx="1">
+            <a:schemeClr val="accent1"/>
+          </a:fillRef>
+          <a:effectRef idx="0">
+            <a:schemeClr val="accent1"/>
+          </a:effectRef>
+          <a:fontRef idx="minor">
+            <a:schemeClr val="lt1"/>
+          </a:fontRef>
+        </p:style>
+        <p:txBody>
+          <a:bodyPr rtlCol="0" anchor="ctr"/>
+          <a:lstStyle/>
+          <a:p>
+            <a:pPr algn="ctr"/>
+            <a:endParaRPr lang="ko-KR" altLang="en-US" dirty="0"/>
+          </a:p>
+        </p:txBody>
+      </p:sp>
+      <p:grpSp>
+        <p:nvGrpSpPr>
+          <p:cNvPr id="5" name="그룹 4">
+            <a:extLst>
+              <a:ext uri="{FF2B5EF4-FFF2-40B4-BE49-F238E27FC236}">
+                <a16:creationId xmlns:a16="http://schemas.microsoft.com/office/drawing/2014/main" id="{AAA86B6C-6DF1-440C-9DB9-F1C80A977408}"/>
+              </a:ext>
+            </a:extLst>
+          </p:cNvPr>
+          <p:cNvGrpSpPr/>
+          <p:nvPr/>
+        </p:nvGrpSpPr>
+        <p:grpSpPr>
+          <a:xfrm>
+            <a:off x="4460238" y="1414016"/>
+            <a:ext cx="322236" cy="322236"/>
+            <a:chOff x="832895" y="808517"/>
+            <a:chExt cx="2324715" cy="2324715"/>
+          </a:xfrm>
+        </p:grpSpPr>
+        <p:grpSp>
+          <p:nvGrpSpPr>
+            <p:cNvPr id="6" name="그룹 5">
+              <a:extLst>
+                <a:ext uri="{FF2B5EF4-FFF2-40B4-BE49-F238E27FC236}">
+                  <a16:creationId xmlns:a16="http://schemas.microsoft.com/office/drawing/2014/main" id="{8F93E79C-70DB-4B23-9BC5-122B8151895E}"/>
+                </a:ext>
+              </a:extLst>
+            </p:cNvPr>
+            <p:cNvGrpSpPr/>
+            <p:nvPr/>
+          </p:nvGrpSpPr>
+          <p:grpSpPr>
+            <a:xfrm>
+              <a:off x="1369870" y="960607"/>
+              <a:ext cx="1428518" cy="2020534"/>
+              <a:chOff x="2288258" y="1445342"/>
+              <a:chExt cx="2940448" cy="4159045"/>
+            </a:xfrm>
+            <a:solidFill>
+              <a:schemeClr val="bg1"/>
+            </a:solidFill>
+            <a:effectLst>
+              <a:outerShdw blurRad="76200" dist="50800" dir="8100000" algn="t" rotWithShape="0">
+                <a:prstClr val="black">
+                  <a:alpha val="40000"/>
+                </a:prstClr>
+              </a:outerShdw>
+            </a:effectLst>
+          </p:grpSpPr>
+          <p:sp>
+            <p:nvSpPr>
+              <p:cNvPr id="8" name="직사각형 7">
+                <a:extLst>
+                  <a:ext uri="{FF2B5EF4-FFF2-40B4-BE49-F238E27FC236}">
+                    <a16:creationId xmlns:a16="http://schemas.microsoft.com/office/drawing/2014/main" id="{68BCA030-F9FD-4A5D-9B95-E1D0FD19DD77}"/>
+                  </a:ext>
+                </a:extLst>
+              </p:cNvPr>
+              <p:cNvSpPr/>
+              <p:nvPr/>
+            </p:nvSpPr>
+            <p:spPr>
+              <a:xfrm>
+                <a:off x="2288258" y="1445342"/>
+                <a:ext cx="762223" cy="4159045"/>
+              </a:xfrm>
+              <a:prstGeom prst="rect">
+                <a:avLst/>
+              </a:prstGeom>
+              <a:grpFill/>
+              <a:ln>
+                <a:noFill/>
+              </a:ln>
+              <a:effectLst/>
+            </p:spPr>
+            <p:style>
+              <a:lnRef idx="2">
+                <a:schemeClr val="accent1">
+                  <a:shade val="50000"/>
+                </a:schemeClr>
+              </a:lnRef>
+              <a:fillRef idx="1">
+                <a:schemeClr val="accent1"/>
+              </a:fillRef>
+              <a:effectRef idx="0">
+                <a:schemeClr val="accent1"/>
+              </a:effectRef>
+              <a:fontRef idx="minor">
+                <a:schemeClr val="lt1"/>
+              </a:fontRef>
+            </p:style>
+            <p:txBody>
+              <a:bodyPr rtlCol="0" anchor="ctr"/>
+              <a:lstStyle/>
+              <a:p>
+                <a:pPr algn="ctr"/>
+                <a:endParaRPr lang="ko-KR" altLang="en-US"/>
+              </a:p>
+            </p:txBody>
+          </p:sp>
+          <p:sp>
+            <p:nvSpPr>
+              <p:cNvPr id="9" name="자유형: 도형 8">
+                <a:extLst>
+                  <a:ext uri="{FF2B5EF4-FFF2-40B4-BE49-F238E27FC236}">
+                    <a16:creationId xmlns:a16="http://schemas.microsoft.com/office/drawing/2014/main" id="{F40E513D-F1CB-4385-90FF-3F13F841E6A7}"/>
+                  </a:ext>
+                </a:extLst>
+              </p:cNvPr>
+              <p:cNvSpPr/>
+              <p:nvPr/>
+            </p:nvSpPr>
+            <p:spPr>
+              <a:xfrm>
+                <a:off x="3333405" y="1445342"/>
+                <a:ext cx="1895301" cy="4159045"/>
+              </a:xfrm>
+              <a:custGeom>
+                <a:avLst/>
+                <a:gdLst>
+                  <a:gd name="connsiteX0" fmla="*/ 448876 w 1639767"/>
+                  <a:gd name="connsiteY0" fmla="*/ 0 h 4167358"/>
+                  <a:gd name="connsiteX1" fmla="*/ 1521229 w 1639767"/>
+                  <a:gd name="connsiteY1" fmla="*/ 598528 h 4167358"/>
+                  <a:gd name="connsiteX2" fmla="*/ 1521229 w 1639767"/>
+                  <a:gd name="connsiteY2" fmla="*/ 3577143 h 4167358"/>
+                  <a:gd name="connsiteX3" fmla="*/ 465501 w 1639767"/>
+                  <a:gd name="connsiteY3" fmla="*/ 4167358 h 4167358"/>
+                  <a:gd name="connsiteX4" fmla="*/ 0 w 1639767"/>
+                  <a:gd name="connsiteY4" fmla="*/ 4167358 h 4167358"/>
+                  <a:gd name="connsiteX5" fmla="*/ 0 w 1639767"/>
+                  <a:gd name="connsiteY5" fmla="*/ 3425864 h 4167358"/>
+                  <a:gd name="connsiteX6" fmla="*/ 232195 w 1639767"/>
+                  <a:gd name="connsiteY6" fmla="*/ 3425864 h 4167358"/>
+                  <a:gd name="connsiteX7" fmla="*/ 912234 w 1639767"/>
+                  <a:gd name="connsiteY7" fmla="*/ 3045682 h 4167358"/>
+                  <a:gd name="connsiteX8" fmla="*/ 912234 w 1639767"/>
+                  <a:gd name="connsiteY8" fmla="*/ 1127031 h 4167358"/>
+                  <a:gd name="connsiteX9" fmla="*/ 221487 w 1639767"/>
+                  <a:gd name="connsiteY9" fmla="*/ 741494 h 4167358"/>
+                  <a:gd name="connsiteX10" fmla="*/ 0 w 1639767"/>
+                  <a:gd name="connsiteY10" fmla="*/ 742474 h 4167358"/>
+                  <a:gd name="connsiteX11" fmla="*/ 0 w 1639767"/>
+                  <a:gd name="connsiteY11" fmla="*/ 1986 h 4167358"/>
+                </a:gdLst>
+                <a:ahLst/>
+                <a:cxnLst>
+                  <a:cxn ang="0">
+                    <a:pos x="connsiteX0" y="connsiteY0"/>
+                  </a:cxn>
+                  <a:cxn ang="0">
+                    <a:pos x="connsiteX1" y="connsiteY1"/>
+                  </a:cxn>
+                  <a:cxn ang="0">
+                    <a:pos x="connsiteX2" y="connsiteY2"/>
+                  </a:cxn>
+                  <a:cxn ang="0">
+                    <a:pos x="connsiteX3" y="connsiteY3"/>
+                  </a:cxn>
+                  <a:cxn ang="0">
+                    <a:pos x="connsiteX4" y="connsiteY4"/>
+                  </a:cxn>
+                  <a:cxn ang="0">
+                    <a:pos x="connsiteX5" y="connsiteY5"/>
+                  </a:cxn>
+                  <a:cxn ang="0">
+                    <a:pos x="connsiteX6" y="connsiteY6"/>
+                  </a:cxn>
+                  <a:cxn ang="0">
+                    <a:pos x="connsiteX7" y="connsiteY7"/>
+                  </a:cxn>
+                  <a:cxn ang="0">
+                    <a:pos x="connsiteX8" y="connsiteY8"/>
+                  </a:cxn>
+                  <a:cxn ang="0">
+                    <a:pos x="connsiteX9" y="connsiteY9"/>
+                  </a:cxn>
+                  <a:cxn ang="0">
+                    <a:pos x="connsiteX10" y="connsiteY10"/>
+                  </a:cxn>
+                  <a:cxn ang="0">
+                    <a:pos x="connsiteX11" y="connsiteY11"/>
+                  </a:cxn>
+                </a:cxnLst>
+                <a:rect l="l" t="t" r="r" b="b"/>
+                <a:pathLst>
+                  <a:path w="1639767" h="4167358">
+                    <a:moveTo>
+                      <a:pt x="448876" y="0"/>
+                    </a:moveTo>
+                    <a:cubicBezTo>
+                      <a:pt x="1024225" y="8313"/>
+                      <a:pt x="1371600" y="147870"/>
+                      <a:pt x="1521229" y="598528"/>
+                    </a:cubicBezTo>
+                    <a:cubicBezTo>
+                      <a:pt x="1670858" y="1109262"/>
+                      <a:pt x="1687484" y="3041471"/>
+                      <a:pt x="1521229" y="3577143"/>
+                    </a:cubicBezTo>
+                    <a:cubicBezTo>
+                      <a:pt x="1330036" y="4119240"/>
+                      <a:pt x="1032537" y="4142420"/>
+                      <a:pt x="465501" y="4167358"/>
+                    </a:cubicBezTo>
+                    <a:lnTo>
+                      <a:pt x="0" y="4167358"/>
+                    </a:lnTo>
+                    <a:lnTo>
+                      <a:pt x="0" y="3425864"/>
+                    </a:lnTo>
+                    <a:lnTo>
+                      <a:pt x="232195" y="3425864"/>
+                    </a:lnTo>
+                    <a:cubicBezTo>
+                      <a:pt x="597447" y="3409801"/>
+                      <a:pt x="789078" y="3394869"/>
+                      <a:pt x="912234" y="3045682"/>
+                    </a:cubicBezTo>
+                    <a:cubicBezTo>
+                      <a:pt x="1019326" y="2700633"/>
+                      <a:pt x="1008616" y="1456016"/>
+                      <a:pt x="912234" y="1127031"/>
+                    </a:cubicBezTo>
+                    <a:cubicBezTo>
+                      <a:pt x="815852" y="836743"/>
+                      <a:pt x="592093" y="746849"/>
+                      <a:pt x="221487" y="741494"/>
+                    </a:cubicBezTo>
+                    <a:lnTo>
+                      <a:pt x="0" y="742474"/>
+                    </a:lnTo>
+                    <a:lnTo>
+                      <a:pt x="0" y="1986"/>
+                    </a:lnTo>
+                    <a:close/>
+                  </a:path>
+                </a:pathLst>
+              </a:custGeom>
+              <a:grpFill/>
+              <a:ln>
+                <a:noFill/>
+              </a:ln>
+              <a:effectLst/>
+            </p:spPr>
+            <p:style>
+              <a:lnRef idx="2">
+                <a:schemeClr val="accent1">
+                  <a:shade val="50000"/>
+                </a:schemeClr>
+              </a:lnRef>
+              <a:fillRef idx="1">
+                <a:schemeClr val="accent1"/>
+              </a:fillRef>
+              <a:effectRef idx="0">
+                <a:schemeClr val="accent1"/>
+              </a:effectRef>
+              <a:fontRef idx="minor">
+                <a:schemeClr val="lt1"/>
+              </a:fontRef>
+            </p:style>
+            <p:txBody>
+              <a:bodyPr wrap="square" rtlCol="0" anchor="ctr">
+                <a:noAutofit/>
+              </a:bodyPr>
+              <a:lstStyle/>
+              <a:p>
+                <a:pPr algn="ctr"/>
+                <a:endParaRPr lang="ko-KR" altLang="en-US"/>
+              </a:p>
+            </p:txBody>
+          </p:sp>
+        </p:grpSp>
+        <p:sp>
+          <p:nvSpPr>
+            <p:cNvPr id="7" name="사각형: 둥근 모서리 6">
+              <a:extLst>
+                <a:ext uri="{FF2B5EF4-FFF2-40B4-BE49-F238E27FC236}">
+                  <a16:creationId xmlns:a16="http://schemas.microsoft.com/office/drawing/2014/main" id="{B0EB1D5B-4245-4ED4-9E95-C248B8E6E84D}"/>
+                </a:ext>
+              </a:extLst>
+            </p:cNvPr>
+            <p:cNvSpPr/>
+            <p:nvPr/>
+          </p:nvSpPr>
+          <p:spPr>
+            <a:xfrm>
+              <a:off x="832895" y="808517"/>
+              <a:ext cx="2324715" cy="2324715"/>
+            </a:xfrm>
+            <a:prstGeom prst="roundRect">
+              <a:avLst/>
+            </a:prstGeom>
+            <a:noFill/>
+            <a:ln>
+              <a:noFill/>
+            </a:ln>
+            <a:effectLst/>
+          </p:spPr>
+          <p:style>
+            <a:lnRef idx="2">
+              <a:schemeClr val="accent1">
+                <a:shade val="50000"/>
+              </a:schemeClr>
+            </a:lnRef>
+            <a:fillRef idx="1">
+              <a:schemeClr val="accent1"/>
+            </a:fillRef>
+            <a:effectRef idx="0">
+              <a:schemeClr val="accent1"/>
+            </a:effectRef>
+            <a:fontRef idx="minor">
+              <a:schemeClr val="lt1"/>
+            </a:fontRef>
+          </p:style>
+          <p:txBody>
+            <a:bodyPr rtlCol="0" anchor="ctr"/>
+            <a:lstStyle/>
+            <a:p>
+              <a:pPr algn="ctr"/>
+              <a:endParaRPr lang="ko-KR" altLang="en-US"/>
+            </a:p>
+          </p:txBody>
+        </p:sp>
+      </p:grpSp>
+      <p:grpSp>
+        <p:nvGrpSpPr>
+          <p:cNvPr id="20" name="그룹 19">
+            <a:extLst>
+              <a:ext uri="{FF2B5EF4-FFF2-40B4-BE49-F238E27FC236}">
+                <a16:creationId xmlns:a16="http://schemas.microsoft.com/office/drawing/2014/main" id="{E802527C-0ADC-494A-A193-74012F44EEA0}"/>
+              </a:ext>
+            </a:extLst>
+          </p:cNvPr>
+          <p:cNvGrpSpPr/>
+          <p:nvPr/>
+        </p:nvGrpSpPr>
+        <p:grpSpPr>
+          <a:xfrm>
+            <a:off x="6735141" y="1174032"/>
+            <a:ext cx="937664" cy="937664"/>
+            <a:chOff x="832895" y="808517"/>
+            <a:chExt cx="2324715" cy="2324715"/>
+          </a:xfrm>
+        </p:grpSpPr>
+        <p:grpSp>
+          <p:nvGrpSpPr>
+            <p:cNvPr id="21" name="그룹 20">
+              <a:extLst>
+                <a:ext uri="{FF2B5EF4-FFF2-40B4-BE49-F238E27FC236}">
+                  <a16:creationId xmlns:a16="http://schemas.microsoft.com/office/drawing/2014/main" id="{CEA9E9BD-663B-4DC3-BF19-826DBCBF9958}"/>
+                </a:ext>
+              </a:extLst>
+            </p:cNvPr>
+            <p:cNvGrpSpPr/>
+            <p:nvPr/>
+          </p:nvGrpSpPr>
+          <p:grpSpPr>
+            <a:xfrm>
+              <a:off x="1369870" y="960607"/>
+              <a:ext cx="1428518" cy="2020534"/>
+              <a:chOff x="2288258" y="1445342"/>
+              <a:chExt cx="2940448" cy="4159045"/>
+            </a:xfrm>
+            <a:solidFill>
+              <a:schemeClr val="bg1"/>
+            </a:solidFill>
+            <a:effectLst>
+              <a:outerShdw blurRad="76200" dist="50800" dir="8100000" algn="t" rotWithShape="0">
+                <a:prstClr val="black">
+                  <a:alpha val="40000"/>
+                </a:prstClr>
+              </a:outerShdw>
+            </a:effectLst>
+          </p:grpSpPr>
+          <p:sp>
+            <p:nvSpPr>
+              <p:cNvPr id="23" name="직사각형 22">
+                <a:extLst>
+                  <a:ext uri="{FF2B5EF4-FFF2-40B4-BE49-F238E27FC236}">
+                    <a16:creationId xmlns:a16="http://schemas.microsoft.com/office/drawing/2014/main" id="{2EE05B02-1916-4C12-AD77-4D997FC8E684}"/>
+                  </a:ext>
+                </a:extLst>
+              </p:cNvPr>
+              <p:cNvSpPr/>
+              <p:nvPr/>
+            </p:nvSpPr>
+            <p:spPr>
+              <a:xfrm>
+                <a:off x="2288258" y="1445342"/>
+                <a:ext cx="762223" cy="4159045"/>
+              </a:xfrm>
+              <a:prstGeom prst="rect">
+                <a:avLst/>
+              </a:prstGeom>
+              <a:grpFill/>
+              <a:ln>
+                <a:noFill/>
+              </a:ln>
+              <a:effectLst/>
+            </p:spPr>
+            <p:style>
+              <a:lnRef idx="2">
+                <a:schemeClr val="accent1">
+                  <a:shade val="50000"/>
+                </a:schemeClr>
+              </a:lnRef>
+              <a:fillRef idx="1">
+                <a:schemeClr val="accent1"/>
+              </a:fillRef>
+              <a:effectRef idx="0">
+                <a:schemeClr val="accent1"/>
+              </a:effectRef>
+              <a:fontRef idx="minor">
+                <a:schemeClr val="lt1"/>
+              </a:fontRef>
+            </p:style>
+            <p:txBody>
+              <a:bodyPr rtlCol="0" anchor="ctr"/>
+              <a:lstStyle/>
+              <a:p>
+                <a:pPr algn="ctr"/>
+                <a:endParaRPr lang="ko-KR" altLang="en-US"/>
+              </a:p>
+            </p:txBody>
+          </p:sp>
+          <p:sp>
+            <p:nvSpPr>
+              <p:cNvPr id="24" name="자유형: 도형 23">
+                <a:extLst>
+                  <a:ext uri="{FF2B5EF4-FFF2-40B4-BE49-F238E27FC236}">
+                    <a16:creationId xmlns:a16="http://schemas.microsoft.com/office/drawing/2014/main" id="{4574995D-2BC6-4C98-A4CD-FDFF43569F15}"/>
+                  </a:ext>
+                </a:extLst>
+              </p:cNvPr>
+              <p:cNvSpPr/>
+              <p:nvPr/>
+            </p:nvSpPr>
+            <p:spPr>
+              <a:xfrm>
+                <a:off x="3333405" y="1445342"/>
+                <a:ext cx="1895301" cy="4159045"/>
+              </a:xfrm>
+              <a:custGeom>
+                <a:avLst/>
+                <a:gdLst>
+                  <a:gd name="connsiteX0" fmla="*/ 448876 w 1639767"/>
+                  <a:gd name="connsiteY0" fmla="*/ 0 h 4167358"/>
+                  <a:gd name="connsiteX1" fmla="*/ 1521229 w 1639767"/>
+                  <a:gd name="connsiteY1" fmla="*/ 598528 h 4167358"/>
+                  <a:gd name="connsiteX2" fmla="*/ 1521229 w 1639767"/>
+                  <a:gd name="connsiteY2" fmla="*/ 3577143 h 4167358"/>
+                  <a:gd name="connsiteX3" fmla="*/ 465501 w 1639767"/>
+                  <a:gd name="connsiteY3" fmla="*/ 4167358 h 4167358"/>
+                  <a:gd name="connsiteX4" fmla="*/ 0 w 1639767"/>
+                  <a:gd name="connsiteY4" fmla="*/ 4167358 h 4167358"/>
+                  <a:gd name="connsiteX5" fmla="*/ 0 w 1639767"/>
+                  <a:gd name="connsiteY5" fmla="*/ 3425864 h 4167358"/>
+                  <a:gd name="connsiteX6" fmla="*/ 232195 w 1639767"/>
+                  <a:gd name="connsiteY6" fmla="*/ 3425864 h 4167358"/>
+                  <a:gd name="connsiteX7" fmla="*/ 912234 w 1639767"/>
+                  <a:gd name="connsiteY7" fmla="*/ 3045682 h 4167358"/>
+                  <a:gd name="connsiteX8" fmla="*/ 912234 w 1639767"/>
+                  <a:gd name="connsiteY8" fmla="*/ 1127031 h 4167358"/>
+                  <a:gd name="connsiteX9" fmla="*/ 221487 w 1639767"/>
+                  <a:gd name="connsiteY9" fmla="*/ 741494 h 4167358"/>
+                  <a:gd name="connsiteX10" fmla="*/ 0 w 1639767"/>
+                  <a:gd name="connsiteY10" fmla="*/ 742474 h 4167358"/>
+                  <a:gd name="connsiteX11" fmla="*/ 0 w 1639767"/>
+                  <a:gd name="connsiteY11" fmla="*/ 1986 h 4167358"/>
+                </a:gdLst>
+                <a:ahLst/>
+                <a:cxnLst>
+                  <a:cxn ang="0">
+                    <a:pos x="connsiteX0" y="connsiteY0"/>
+                  </a:cxn>
+                  <a:cxn ang="0">
+                    <a:pos x="connsiteX1" y="connsiteY1"/>
+                  </a:cxn>
+                  <a:cxn ang="0">
+                    <a:pos x="connsiteX2" y="connsiteY2"/>
+                  </a:cxn>
+                  <a:cxn ang="0">
+                    <a:pos x="connsiteX3" y="connsiteY3"/>
+                  </a:cxn>
+                  <a:cxn ang="0">
+                    <a:pos x="connsiteX4" y="connsiteY4"/>
+                  </a:cxn>
+                  <a:cxn ang="0">
+                    <a:pos x="connsiteX5" y="connsiteY5"/>
+                  </a:cxn>
+                  <a:cxn ang="0">
+                    <a:pos x="connsiteX6" y="connsiteY6"/>
+                  </a:cxn>
+                  <a:cxn ang="0">
+                    <a:pos x="connsiteX7" y="connsiteY7"/>
+                  </a:cxn>
+                  <a:cxn ang="0">
+                    <a:pos x="connsiteX8" y="connsiteY8"/>
+                  </a:cxn>
+                  <a:cxn ang="0">
+                    <a:pos x="connsiteX9" y="connsiteY9"/>
+                  </a:cxn>
+                  <a:cxn ang="0">
+                    <a:pos x="connsiteX10" y="connsiteY10"/>
+                  </a:cxn>
+                  <a:cxn ang="0">
+                    <a:pos x="connsiteX11" y="connsiteY11"/>
+                  </a:cxn>
+                </a:cxnLst>
+                <a:rect l="l" t="t" r="r" b="b"/>
+                <a:pathLst>
+                  <a:path w="1639767" h="4167358">
+                    <a:moveTo>
+                      <a:pt x="448876" y="0"/>
+                    </a:moveTo>
+                    <a:cubicBezTo>
+                      <a:pt x="1024225" y="8313"/>
+                      <a:pt x="1371600" y="147870"/>
+                      <a:pt x="1521229" y="598528"/>
+                    </a:cubicBezTo>
+                    <a:cubicBezTo>
+                      <a:pt x="1670858" y="1109262"/>
+                      <a:pt x="1687484" y="3041471"/>
+                      <a:pt x="1521229" y="3577143"/>
+                    </a:cubicBezTo>
+                    <a:cubicBezTo>
+                      <a:pt x="1330036" y="4119240"/>
+                      <a:pt x="1032537" y="4142420"/>
+                      <a:pt x="465501" y="4167358"/>
+                    </a:cubicBezTo>
+                    <a:lnTo>
+                      <a:pt x="0" y="4167358"/>
+                    </a:lnTo>
+                    <a:lnTo>
+                      <a:pt x="0" y="3425864"/>
+                    </a:lnTo>
+                    <a:lnTo>
+                      <a:pt x="232195" y="3425864"/>
+                    </a:lnTo>
+                    <a:cubicBezTo>
+                      <a:pt x="597447" y="3409801"/>
+                      <a:pt x="789078" y="3394869"/>
+                      <a:pt x="912234" y="3045682"/>
+                    </a:cubicBezTo>
+                    <a:cubicBezTo>
+                      <a:pt x="1019326" y="2700633"/>
+                      <a:pt x="1008616" y="1456016"/>
+                      <a:pt x="912234" y="1127031"/>
+                    </a:cubicBezTo>
+                    <a:cubicBezTo>
+                      <a:pt x="815852" y="836743"/>
+                      <a:pt x="592093" y="746849"/>
+                      <a:pt x="221487" y="741494"/>
+                    </a:cubicBezTo>
+                    <a:lnTo>
+                      <a:pt x="0" y="742474"/>
+                    </a:lnTo>
+                    <a:lnTo>
+                      <a:pt x="0" y="1986"/>
+                    </a:lnTo>
+                    <a:close/>
+                  </a:path>
+                </a:pathLst>
+              </a:custGeom>
+              <a:grpFill/>
+              <a:ln>
+                <a:noFill/>
+              </a:ln>
+              <a:effectLst/>
+            </p:spPr>
+            <p:style>
+              <a:lnRef idx="2">
+                <a:schemeClr val="accent1">
+                  <a:shade val="50000"/>
+                </a:schemeClr>
+              </a:lnRef>
+              <a:fillRef idx="1">
+                <a:schemeClr val="accent1"/>
+              </a:fillRef>
+              <a:effectRef idx="0">
+                <a:schemeClr val="accent1"/>
+              </a:effectRef>
+              <a:fontRef idx="minor">
+                <a:schemeClr val="lt1"/>
+              </a:fontRef>
+            </p:style>
+            <p:txBody>
+              <a:bodyPr wrap="square" rtlCol="0" anchor="ctr">
+                <a:noAutofit/>
+              </a:bodyPr>
+              <a:lstStyle/>
+              <a:p>
+                <a:pPr algn="ctr"/>
+                <a:endParaRPr lang="ko-KR" altLang="en-US"/>
+              </a:p>
+            </p:txBody>
+          </p:sp>
+        </p:grpSp>
+        <p:sp>
+          <p:nvSpPr>
+            <p:cNvPr id="22" name="사각형: 둥근 모서리 21">
+              <a:extLst>
+                <a:ext uri="{FF2B5EF4-FFF2-40B4-BE49-F238E27FC236}">
+                  <a16:creationId xmlns:a16="http://schemas.microsoft.com/office/drawing/2014/main" id="{D6581BA4-D3C6-4168-83B6-2F3F09BF6BFD}"/>
+                </a:ext>
+              </a:extLst>
+            </p:cNvPr>
+            <p:cNvSpPr/>
+            <p:nvPr/>
+          </p:nvSpPr>
+          <p:spPr>
+            <a:xfrm>
+              <a:off x="832895" y="808517"/>
+              <a:ext cx="2324715" cy="2324715"/>
+            </a:xfrm>
+            <a:prstGeom prst="roundRect">
+              <a:avLst/>
+            </a:prstGeom>
+            <a:noFill/>
+            <a:ln>
+              <a:noFill/>
+            </a:ln>
+            <a:effectLst/>
+          </p:spPr>
+          <p:style>
+            <a:lnRef idx="2">
+              <a:schemeClr val="accent1">
+                <a:shade val="50000"/>
+              </a:schemeClr>
+            </a:lnRef>
+            <a:fillRef idx="1">
+              <a:schemeClr val="accent1"/>
+            </a:fillRef>
+            <a:effectRef idx="0">
+              <a:schemeClr val="accent1"/>
+            </a:effectRef>
+            <a:fontRef idx="minor">
+              <a:schemeClr val="lt1"/>
+            </a:fontRef>
+          </p:style>
+          <p:txBody>
+            <a:bodyPr rtlCol="0" anchor="ctr"/>
+            <a:lstStyle/>
+            <a:p>
+              <a:pPr algn="ctr"/>
+              <a:endParaRPr lang="ko-KR" altLang="en-US"/>
+            </a:p>
+          </p:txBody>
+        </p:sp>
+      </p:grpSp>
+      <p:grpSp>
+        <p:nvGrpSpPr>
+          <p:cNvPr id="25" name="그룹 24">
+            <a:extLst>
+              <a:ext uri="{FF2B5EF4-FFF2-40B4-BE49-F238E27FC236}">
+                <a16:creationId xmlns:a16="http://schemas.microsoft.com/office/drawing/2014/main" id="{94625B4B-E95E-4B7F-9926-1CD7434ABD35}"/>
+              </a:ext>
+            </a:extLst>
+          </p:cNvPr>
+          <p:cNvGrpSpPr/>
+          <p:nvPr/>
+        </p:nvGrpSpPr>
+        <p:grpSpPr>
+          <a:xfrm>
+            <a:off x="9749150" y="1174032"/>
+            <a:ext cx="937664" cy="937664"/>
+            <a:chOff x="832895" y="808517"/>
+            <a:chExt cx="2324715" cy="2324715"/>
+          </a:xfrm>
+        </p:grpSpPr>
+        <p:grpSp>
+          <p:nvGrpSpPr>
+            <p:cNvPr id="26" name="그룹 25">
+              <a:extLst>
+                <a:ext uri="{FF2B5EF4-FFF2-40B4-BE49-F238E27FC236}">
+                  <a16:creationId xmlns:a16="http://schemas.microsoft.com/office/drawing/2014/main" id="{0E9DCA63-58A6-4DCB-B3AE-20730DCA47A6}"/>
+                </a:ext>
+              </a:extLst>
+            </p:cNvPr>
+            <p:cNvGrpSpPr/>
+            <p:nvPr/>
+          </p:nvGrpSpPr>
+          <p:grpSpPr>
+            <a:xfrm>
+              <a:off x="1369870" y="960607"/>
+              <a:ext cx="1428518" cy="2020534"/>
+              <a:chOff x="2288258" y="1445342"/>
+              <a:chExt cx="2940448" cy="4159045"/>
+            </a:xfrm>
+            <a:solidFill>
+              <a:schemeClr val="bg1"/>
+            </a:solidFill>
+            <a:effectLst>
+              <a:outerShdw blurRad="76200" dist="50800" dir="8100000" algn="t" rotWithShape="0">
+                <a:prstClr val="black">
+                  <a:alpha val="40000"/>
+                </a:prstClr>
+              </a:outerShdw>
+            </a:effectLst>
+          </p:grpSpPr>
+          <p:sp>
+            <p:nvSpPr>
+              <p:cNvPr id="28" name="직사각형 27">
+                <a:extLst>
+                  <a:ext uri="{FF2B5EF4-FFF2-40B4-BE49-F238E27FC236}">
+                    <a16:creationId xmlns:a16="http://schemas.microsoft.com/office/drawing/2014/main" id="{C4978889-42B2-4AC8-9ACB-A2824F172750}"/>
+                  </a:ext>
+                </a:extLst>
+              </p:cNvPr>
+              <p:cNvSpPr/>
+              <p:nvPr/>
+            </p:nvSpPr>
+            <p:spPr>
+              <a:xfrm>
+                <a:off x="2288258" y="1445342"/>
+                <a:ext cx="762223" cy="4159045"/>
+              </a:xfrm>
+              <a:prstGeom prst="rect">
+                <a:avLst/>
+              </a:prstGeom>
+              <a:grpFill/>
+              <a:ln>
+                <a:noFill/>
+              </a:ln>
+              <a:effectLst/>
+            </p:spPr>
+            <p:style>
+              <a:lnRef idx="2">
+                <a:schemeClr val="accent1">
+                  <a:shade val="50000"/>
+                </a:schemeClr>
+              </a:lnRef>
+              <a:fillRef idx="1">
+                <a:schemeClr val="accent1"/>
+              </a:fillRef>
+              <a:effectRef idx="0">
+                <a:schemeClr val="accent1"/>
+              </a:effectRef>
+              <a:fontRef idx="minor">
+                <a:schemeClr val="lt1"/>
+              </a:fontRef>
+            </p:style>
+            <p:txBody>
+              <a:bodyPr rtlCol="0" anchor="ctr"/>
+              <a:lstStyle/>
+              <a:p>
+                <a:pPr algn="ctr"/>
+                <a:endParaRPr lang="ko-KR" altLang="en-US"/>
+              </a:p>
+            </p:txBody>
+          </p:sp>
+          <p:sp>
+            <p:nvSpPr>
+              <p:cNvPr id="29" name="자유형: 도형 28">
+                <a:extLst>
+                  <a:ext uri="{FF2B5EF4-FFF2-40B4-BE49-F238E27FC236}">
+                    <a16:creationId xmlns:a16="http://schemas.microsoft.com/office/drawing/2014/main" id="{E47AF77D-4531-47A3-BC50-599B06E35018}"/>
+                  </a:ext>
+                </a:extLst>
+              </p:cNvPr>
+              <p:cNvSpPr/>
+              <p:nvPr/>
+            </p:nvSpPr>
+            <p:spPr>
+              <a:xfrm>
+                <a:off x="3333405" y="1445342"/>
+                <a:ext cx="1895301" cy="4159045"/>
+              </a:xfrm>
+              <a:custGeom>
+                <a:avLst/>
+                <a:gdLst>
+                  <a:gd name="connsiteX0" fmla="*/ 448876 w 1639767"/>
+                  <a:gd name="connsiteY0" fmla="*/ 0 h 4167358"/>
+                  <a:gd name="connsiteX1" fmla="*/ 1521229 w 1639767"/>
+                  <a:gd name="connsiteY1" fmla="*/ 598528 h 4167358"/>
+                  <a:gd name="connsiteX2" fmla="*/ 1521229 w 1639767"/>
+                  <a:gd name="connsiteY2" fmla="*/ 3577143 h 4167358"/>
+                  <a:gd name="connsiteX3" fmla="*/ 465501 w 1639767"/>
+                  <a:gd name="connsiteY3" fmla="*/ 4167358 h 4167358"/>
+                  <a:gd name="connsiteX4" fmla="*/ 0 w 1639767"/>
+                  <a:gd name="connsiteY4" fmla="*/ 4167358 h 4167358"/>
+                  <a:gd name="connsiteX5" fmla="*/ 0 w 1639767"/>
+                  <a:gd name="connsiteY5" fmla="*/ 3425864 h 4167358"/>
+                  <a:gd name="connsiteX6" fmla="*/ 232195 w 1639767"/>
+                  <a:gd name="connsiteY6" fmla="*/ 3425864 h 4167358"/>
+                  <a:gd name="connsiteX7" fmla="*/ 912234 w 1639767"/>
+                  <a:gd name="connsiteY7" fmla="*/ 3045682 h 4167358"/>
+                  <a:gd name="connsiteX8" fmla="*/ 912234 w 1639767"/>
+                  <a:gd name="connsiteY8" fmla="*/ 1127031 h 4167358"/>
+                  <a:gd name="connsiteX9" fmla="*/ 221487 w 1639767"/>
+                  <a:gd name="connsiteY9" fmla="*/ 741494 h 4167358"/>
+                  <a:gd name="connsiteX10" fmla="*/ 0 w 1639767"/>
+                  <a:gd name="connsiteY10" fmla="*/ 742474 h 4167358"/>
+                  <a:gd name="connsiteX11" fmla="*/ 0 w 1639767"/>
+                  <a:gd name="connsiteY11" fmla="*/ 1986 h 4167358"/>
+                </a:gdLst>
+                <a:ahLst/>
+                <a:cxnLst>
+                  <a:cxn ang="0">
+                    <a:pos x="connsiteX0" y="connsiteY0"/>
+                  </a:cxn>
+                  <a:cxn ang="0">
+                    <a:pos x="connsiteX1" y="connsiteY1"/>
+                  </a:cxn>
+                  <a:cxn ang="0">
+                    <a:pos x="connsiteX2" y="connsiteY2"/>
+                  </a:cxn>
+                  <a:cxn ang="0">
+                    <a:pos x="connsiteX3" y="connsiteY3"/>
+                  </a:cxn>
+                  <a:cxn ang="0">
+                    <a:pos x="connsiteX4" y="connsiteY4"/>
+                  </a:cxn>
+                  <a:cxn ang="0">
+                    <a:pos x="connsiteX5" y="connsiteY5"/>
+                  </a:cxn>
+                  <a:cxn ang="0">
+                    <a:pos x="connsiteX6" y="connsiteY6"/>
+                  </a:cxn>
+                  <a:cxn ang="0">
+                    <a:pos x="connsiteX7" y="connsiteY7"/>
+                  </a:cxn>
+                  <a:cxn ang="0">
+                    <a:pos x="connsiteX8" y="connsiteY8"/>
+                  </a:cxn>
+                  <a:cxn ang="0">
+                    <a:pos x="connsiteX9" y="connsiteY9"/>
+                  </a:cxn>
+                  <a:cxn ang="0">
+                    <a:pos x="connsiteX10" y="connsiteY10"/>
+                  </a:cxn>
+                  <a:cxn ang="0">
+                    <a:pos x="connsiteX11" y="connsiteY11"/>
+                  </a:cxn>
+                </a:cxnLst>
+                <a:rect l="l" t="t" r="r" b="b"/>
+                <a:pathLst>
+                  <a:path w="1639767" h="4167358">
+                    <a:moveTo>
+                      <a:pt x="448876" y="0"/>
+                    </a:moveTo>
+                    <a:cubicBezTo>
+                      <a:pt x="1024225" y="8313"/>
+                      <a:pt x="1371600" y="147870"/>
+                      <a:pt x="1521229" y="598528"/>
+                    </a:cubicBezTo>
+                    <a:cubicBezTo>
+                      <a:pt x="1670858" y="1109262"/>
+                      <a:pt x="1687484" y="3041471"/>
+                      <a:pt x="1521229" y="3577143"/>
+                    </a:cubicBezTo>
+                    <a:cubicBezTo>
+                      <a:pt x="1330036" y="4119240"/>
+                      <a:pt x="1032537" y="4142420"/>
+                      <a:pt x="465501" y="4167358"/>
+                    </a:cubicBezTo>
+                    <a:lnTo>
+                      <a:pt x="0" y="4167358"/>
+                    </a:lnTo>
+                    <a:lnTo>
+                      <a:pt x="0" y="3425864"/>
+                    </a:lnTo>
+                    <a:lnTo>
+                      <a:pt x="232195" y="3425864"/>
+                    </a:lnTo>
+                    <a:cubicBezTo>
+                      <a:pt x="597447" y="3409801"/>
+                      <a:pt x="789078" y="3394869"/>
+                      <a:pt x="912234" y="3045682"/>
+                    </a:cubicBezTo>
+                    <a:cubicBezTo>
+                      <a:pt x="1019326" y="2700633"/>
+                      <a:pt x="1008616" y="1456016"/>
+                      <a:pt x="912234" y="1127031"/>
+                    </a:cubicBezTo>
+                    <a:cubicBezTo>
+                      <a:pt x="815852" y="836743"/>
+                      <a:pt x="592093" y="746849"/>
+                      <a:pt x="221487" y="741494"/>
+                    </a:cubicBezTo>
+                    <a:lnTo>
+                      <a:pt x="0" y="742474"/>
+                    </a:lnTo>
+                    <a:lnTo>
+                      <a:pt x="0" y="1986"/>
+                    </a:lnTo>
+                    <a:close/>
+                  </a:path>
+                </a:pathLst>
+              </a:custGeom>
+              <a:grpFill/>
+              <a:ln>
+                <a:noFill/>
+              </a:ln>
+              <a:effectLst/>
+            </p:spPr>
+            <p:style>
+              <a:lnRef idx="2">
+                <a:schemeClr val="accent1">
+                  <a:shade val="50000"/>
+                </a:schemeClr>
+              </a:lnRef>
+              <a:fillRef idx="1">
+                <a:schemeClr val="accent1"/>
+              </a:fillRef>
+              <a:effectRef idx="0">
+                <a:schemeClr val="accent1"/>
+              </a:effectRef>
+              <a:fontRef idx="minor">
+                <a:schemeClr val="lt1"/>
+              </a:fontRef>
+            </p:style>
+            <p:txBody>
+              <a:bodyPr wrap="square" rtlCol="0" anchor="ctr">
+                <a:noAutofit/>
+              </a:bodyPr>
+              <a:lstStyle/>
+              <a:p>
+                <a:pPr algn="ctr"/>
+                <a:endParaRPr lang="ko-KR" altLang="en-US"/>
+              </a:p>
+            </p:txBody>
+          </p:sp>
+        </p:grpSp>
+        <p:sp>
+          <p:nvSpPr>
+            <p:cNvPr id="27" name="사각형: 둥근 모서리 26">
+              <a:extLst>
+                <a:ext uri="{FF2B5EF4-FFF2-40B4-BE49-F238E27FC236}">
+                  <a16:creationId xmlns:a16="http://schemas.microsoft.com/office/drawing/2014/main" id="{2F6E233F-F886-4DF7-97F6-DF31C27F4FFA}"/>
+                </a:ext>
+              </a:extLst>
+            </p:cNvPr>
+            <p:cNvSpPr/>
+            <p:nvPr/>
+          </p:nvSpPr>
+          <p:spPr>
+            <a:xfrm>
+              <a:off x="832895" y="808517"/>
+              <a:ext cx="2324715" cy="2324715"/>
+            </a:xfrm>
+            <a:prstGeom prst="roundRect">
+              <a:avLst/>
+            </a:prstGeom>
+            <a:noFill/>
+            <a:ln>
+              <a:noFill/>
+            </a:ln>
+            <a:effectLst/>
+          </p:spPr>
+          <p:style>
+            <a:lnRef idx="2">
+              <a:schemeClr val="accent1">
+                <a:shade val="50000"/>
+              </a:schemeClr>
+            </a:lnRef>
+            <a:fillRef idx="1">
+              <a:schemeClr val="accent1"/>
+            </a:fillRef>
+            <a:effectRef idx="0">
+              <a:schemeClr val="accent1"/>
+            </a:effectRef>
+            <a:fontRef idx="minor">
+              <a:schemeClr val="lt1"/>
+            </a:fontRef>
+          </p:style>
+          <p:txBody>
+            <a:bodyPr rtlCol="0" anchor="ctr"/>
+            <a:lstStyle/>
+            <a:p>
+              <a:pPr algn="ctr"/>
+              <a:endParaRPr lang="ko-KR" altLang="en-US"/>
+            </a:p>
+          </p:txBody>
+        </p:sp>
+      </p:grpSp>
+      <p:grpSp>
+        <p:nvGrpSpPr>
+          <p:cNvPr id="30" name="그룹 29">
+            <a:extLst>
+              <a:ext uri="{FF2B5EF4-FFF2-40B4-BE49-F238E27FC236}">
+                <a16:creationId xmlns:a16="http://schemas.microsoft.com/office/drawing/2014/main" id="{834207E9-91AD-461C-8F54-24E9C0925880}"/>
+              </a:ext>
+            </a:extLst>
+          </p:cNvPr>
+          <p:cNvGrpSpPr/>
+          <p:nvPr/>
+        </p:nvGrpSpPr>
+        <p:grpSpPr>
+          <a:xfrm>
+            <a:off x="7023807" y="3923100"/>
+            <a:ext cx="527456" cy="527456"/>
+            <a:chOff x="832895" y="808517"/>
+            <a:chExt cx="2324715" cy="2324715"/>
+          </a:xfrm>
+        </p:grpSpPr>
+        <p:grpSp>
+          <p:nvGrpSpPr>
+            <p:cNvPr id="31" name="그룹 30">
+              <a:extLst>
+                <a:ext uri="{FF2B5EF4-FFF2-40B4-BE49-F238E27FC236}">
+                  <a16:creationId xmlns:a16="http://schemas.microsoft.com/office/drawing/2014/main" id="{D1CA14B9-C41A-430C-A87B-7B221BDF78EE}"/>
+                </a:ext>
+              </a:extLst>
+            </p:cNvPr>
+            <p:cNvGrpSpPr/>
+            <p:nvPr/>
+          </p:nvGrpSpPr>
+          <p:grpSpPr>
+            <a:xfrm>
+              <a:off x="1369870" y="960607"/>
+              <a:ext cx="1428518" cy="2020534"/>
+              <a:chOff x="2288258" y="1445342"/>
+              <a:chExt cx="2940448" cy="4159045"/>
+            </a:xfrm>
+            <a:solidFill>
+              <a:schemeClr val="bg1"/>
+            </a:solidFill>
+            <a:effectLst>
+              <a:outerShdw blurRad="76200" dist="50800" dir="8100000" algn="t" rotWithShape="0">
+                <a:prstClr val="black">
+                  <a:alpha val="40000"/>
+                </a:prstClr>
+              </a:outerShdw>
+            </a:effectLst>
+          </p:grpSpPr>
+          <p:sp>
+            <p:nvSpPr>
+              <p:cNvPr id="33" name="직사각형 32">
+                <a:extLst>
+                  <a:ext uri="{FF2B5EF4-FFF2-40B4-BE49-F238E27FC236}">
+                    <a16:creationId xmlns:a16="http://schemas.microsoft.com/office/drawing/2014/main" id="{9B7FFF13-30DC-4E9B-96EE-8F6149D1B495}"/>
+                  </a:ext>
+                </a:extLst>
+              </p:cNvPr>
+              <p:cNvSpPr/>
+              <p:nvPr/>
+            </p:nvSpPr>
+            <p:spPr>
+              <a:xfrm>
+                <a:off x="2288258" y="1445342"/>
+                <a:ext cx="762223" cy="4159045"/>
+              </a:xfrm>
+              <a:prstGeom prst="rect">
+                <a:avLst/>
+              </a:prstGeom>
+              <a:grpFill/>
+              <a:ln>
+                <a:noFill/>
+              </a:ln>
+              <a:effectLst/>
+            </p:spPr>
+            <p:style>
+              <a:lnRef idx="2">
+                <a:schemeClr val="accent1">
+                  <a:shade val="50000"/>
+                </a:schemeClr>
+              </a:lnRef>
+              <a:fillRef idx="1">
+                <a:schemeClr val="accent1"/>
+              </a:fillRef>
+              <a:effectRef idx="0">
+                <a:schemeClr val="accent1"/>
+              </a:effectRef>
+              <a:fontRef idx="minor">
+                <a:schemeClr val="lt1"/>
+              </a:fontRef>
+            </p:style>
+            <p:txBody>
+              <a:bodyPr rtlCol="0" anchor="ctr"/>
+              <a:lstStyle/>
+              <a:p>
+                <a:pPr algn="ctr"/>
+                <a:endParaRPr lang="ko-KR" altLang="en-US"/>
+              </a:p>
+            </p:txBody>
+          </p:sp>
+          <p:sp>
+            <p:nvSpPr>
+              <p:cNvPr id="34" name="자유형: 도형 33">
+                <a:extLst>
+                  <a:ext uri="{FF2B5EF4-FFF2-40B4-BE49-F238E27FC236}">
+                    <a16:creationId xmlns:a16="http://schemas.microsoft.com/office/drawing/2014/main" id="{20749905-073E-4734-B5F7-BC28BBCA650A}"/>
+                  </a:ext>
+                </a:extLst>
+              </p:cNvPr>
+              <p:cNvSpPr/>
+              <p:nvPr/>
+            </p:nvSpPr>
+            <p:spPr>
+              <a:xfrm>
+                <a:off x="3333405" y="1445342"/>
+                <a:ext cx="1895301" cy="4159045"/>
+              </a:xfrm>
+              <a:custGeom>
+                <a:avLst/>
+                <a:gdLst>
+                  <a:gd name="connsiteX0" fmla="*/ 448876 w 1639767"/>
+                  <a:gd name="connsiteY0" fmla="*/ 0 h 4167358"/>
+                  <a:gd name="connsiteX1" fmla="*/ 1521229 w 1639767"/>
+                  <a:gd name="connsiteY1" fmla="*/ 598528 h 4167358"/>
+                  <a:gd name="connsiteX2" fmla="*/ 1521229 w 1639767"/>
+                  <a:gd name="connsiteY2" fmla="*/ 3577143 h 4167358"/>
+                  <a:gd name="connsiteX3" fmla="*/ 465501 w 1639767"/>
+                  <a:gd name="connsiteY3" fmla="*/ 4167358 h 4167358"/>
+                  <a:gd name="connsiteX4" fmla="*/ 0 w 1639767"/>
+                  <a:gd name="connsiteY4" fmla="*/ 4167358 h 4167358"/>
+                  <a:gd name="connsiteX5" fmla="*/ 0 w 1639767"/>
+                  <a:gd name="connsiteY5" fmla="*/ 3425864 h 4167358"/>
+                  <a:gd name="connsiteX6" fmla="*/ 232195 w 1639767"/>
+                  <a:gd name="connsiteY6" fmla="*/ 3425864 h 4167358"/>
+                  <a:gd name="connsiteX7" fmla="*/ 912234 w 1639767"/>
+                  <a:gd name="connsiteY7" fmla="*/ 3045682 h 4167358"/>
+                  <a:gd name="connsiteX8" fmla="*/ 912234 w 1639767"/>
+                  <a:gd name="connsiteY8" fmla="*/ 1127031 h 4167358"/>
+                  <a:gd name="connsiteX9" fmla="*/ 221487 w 1639767"/>
+                  <a:gd name="connsiteY9" fmla="*/ 741494 h 4167358"/>
+                  <a:gd name="connsiteX10" fmla="*/ 0 w 1639767"/>
+                  <a:gd name="connsiteY10" fmla="*/ 742474 h 4167358"/>
+                  <a:gd name="connsiteX11" fmla="*/ 0 w 1639767"/>
+                  <a:gd name="connsiteY11" fmla="*/ 1986 h 4167358"/>
+                </a:gdLst>
+                <a:ahLst/>
+                <a:cxnLst>
+                  <a:cxn ang="0">
+                    <a:pos x="connsiteX0" y="connsiteY0"/>
+                  </a:cxn>
+                  <a:cxn ang="0">
+                    <a:pos x="connsiteX1" y="connsiteY1"/>
+                  </a:cxn>
+                  <a:cxn ang="0">
+                    <a:pos x="connsiteX2" y="connsiteY2"/>
+                  </a:cxn>
+                  <a:cxn ang="0">
+                    <a:pos x="connsiteX3" y="connsiteY3"/>
+                  </a:cxn>
+                  <a:cxn ang="0">
+                    <a:pos x="connsiteX4" y="connsiteY4"/>
+                  </a:cxn>
+                  <a:cxn ang="0">
+                    <a:pos x="connsiteX5" y="connsiteY5"/>
+                  </a:cxn>
+                  <a:cxn ang="0">
+                    <a:pos x="connsiteX6" y="connsiteY6"/>
+                  </a:cxn>
+                  <a:cxn ang="0">
+                    <a:pos x="connsiteX7" y="connsiteY7"/>
+                  </a:cxn>
+                  <a:cxn ang="0">
+                    <a:pos x="connsiteX8" y="connsiteY8"/>
+                  </a:cxn>
+                  <a:cxn ang="0">
+                    <a:pos x="connsiteX9" y="connsiteY9"/>
+                  </a:cxn>
+                  <a:cxn ang="0">
+                    <a:pos x="connsiteX10" y="connsiteY10"/>
+                  </a:cxn>
+                  <a:cxn ang="0">
+                    <a:pos x="connsiteX11" y="connsiteY11"/>
+                  </a:cxn>
+                </a:cxnLst>
+                <a:rect l="l" t="t" r="r" b="b"/>
+                <a:pathLst>
+                  <a:path w="1639767" h="4167358">
+                    <a:moveTo>
+                      <a:pt x="448876" y="0"/>
+                    </a:moveTo>
+                    <a:cubicBezTo>
+                      <a:pt x="1024225" y="8313"/>
+                      <a:pt x="1371600" y="147870"/>
+                      <a:pt x="1521229" y="598528"/>
+                    </a:cubicBezTo>
+                    <a:cubicBezTo>
+                      <a:pt x="1670858" y="1109262"/>
+                      <a:pt x="1687484" y="3041471"/>
+                      <a:pt x="1521229" y="3577143"/>
+                    </a:cubicBezTo>
+                    <a:cubicBezTo>
+                      <a:pt x="1330036" y="4119240"/>
+                      <a:pt x="1032537" y="4142420"/>
+                      <a:pt x="465501" y="4167358"/>
+                    </a:cubicBezTo>
+                    <a:lnTo>
+                      <a:pt x="0" y="4167358"/>
+                    </a:lnTo>
+                    <a:lnTo>
+                      <a:pt x="0" y="3425864"/>
+                    </a:lnTo>
+                    <a:lnTo>
+                      <a:pt x="232195" y="3425864"/>
+                    </a:lnTo>
+                    <a:cubicBezTo>
+                      <a:pt x="597447" y="3409801"/>
+                      <a:pt x="789078" y="3394869"/>
+                      <a:pt x="912234" y="3045682"/>
+                    </a:cubicBezTo>
+                    <a:cubicBezTo>
+                      <a:pt x="1019326" y="2700633"/>
+                      <a:pt x="1008616" y="1456016"/>
+                      <a:pt x="912234" y="1127031"/>
+                    </a:cubicBezTo>
+                    <a:cubicBezTo>
+                      <a:pt x="815852" y="836743"/>
+                      <a:pt x="592093" y="746849"/>
+                      <a:pt x="221487" y="741494"/>
+                    </a:cubicBezTo>
+                    <a:lnTo>
+                      <a:pt x="0" y="742474"/>
+                    </a:lnTo>
+                    <a:lnTo>
+                      <a:pt x="0" y="1986"/>
+                    </a:lnTo>
+                    <a:close/>
+                  </a:path>
+                </a:pathLst>
+              </a:custGeom>
+              <a:grpFill/>
+              <a:ln>
+                <a:noFill/>
+              </a:ln>
+              <a:effectLst/>
+            </p:spPr>
+            <p:style>
+              <a:lnRef idx="2">
+                <a:schemeClr val="accent1">
+                  <a:shade val="50000"/>
+                </a:schemeClr>
+              </a:lnRef>
+              <a:fillRef idx="1">
+                <a:schemeClr val="accent1"/>
+              </a:fillRef>
+              <a:effectRef idx="0">
+                <a:schemeClr val="accent1"/>
+              </a:effectRef>
+              <a:fontRef idx="minor">
+                <a:schemeClr val="lt1"/>
+              </a:fontRef>
+            </p:style>
+            <p:txBody>
+              <a:bodyPr wrap="square" rtlCol="0" anchor="ctr">
+                <a:noAutofit/>
+              </a:bodyPr>
+              <a:lstStyle/>
+              <a:p>
+                <a:pPr algn="ctr"/>
+                <a:endParaRPr lang="ko-KR" altLang="en-US"/>
+              </a:p>
+            </p:txBody>
+          </p:sp>
+        </p:grpSp>
+        <p:sp>
+          <p:nvSpPr>
+            <p:cNvPr id="32" name="사각형: 둥근 모서리 31">
+              <a:extLst>
+                <a:ext uri="{FF2B5EF4-FFF2-40B4-BE49-F238E27FC236}">
+                  <a16:creationId xmlns:a16="http://schemas.microsoft.com/office/drawing/2014/main" id="{29FE6625-75C0-424B-ABB8-ACC01ACF94F0}"/>
+                </a:ext>
+              </a:extLst>
+            </p:cNvPr>
+            <p:cNvSpPr/>
+            <p:nvPr/>
+          </p:nvSpPr>
+          <p:spPr>
+            <a:xfrm>
+              <a:off x="832895" y="808517"/>
+              <a:ext cx="2324715" cy="2324715"/>
+            </a:xfrm>
+            <a:prstGeom prst="roundRect">
+              <a:avLst/>
+            </a:prstGeom>
+            <a:noFill/>
+            <a:ln>
+              <a:noFill/>
+            </a:ln>
+            <a:effectLst/>
+          </p:spPr>
+          <p:style>
+            <a:lnRef idx="2">
+              <a:schemeClr val="accent1">
+                <a:shade val="50000"/>
+              </a:schemeClr>
+            </a:lnRef>
+            <a:fillRef idx="1">
+              <a:schemeClr val="accent1"/>
+            </a:fillRef>
+            <a:effectRef idx="0">
+              <a:schemeClr val="accent1"/>
+            </a:effectRef>
+            <a:fontRef idx="minor">
+              <a:schemeClr val="lt1"/>
+            </a:fontRef>
+          </p:style>
+          <p:txBody>
+            <a:bodyPr rtlCol="0" anchor="ctr"/>
+            <a:lstStyle/>
+            <a:p>
+              <a:pPr algn="ctr"/>
+              <a:endParaRPr lang="ko-KR" altLang="en-US"/>
+            </a:p>
+          </p:txBody>
+        </p:sp>
+      </p:grpSp>
+      <p:grpSp>
+        <p:nvGrpSpPr>
+          <p:cNvPr id="47" name="그룹 46">
+            <a:extLst>
+              <a:ext uri="{FF2B5EF4-FFF2-40B4-BE49-F238E27FC236}">
+                <a16:creationId xmlns:a16="http://schemas.microsoft.com/office/drawing/2014/main" id="{0DE276C3-6F9B-4D95-A7C8-E15ED74D8560}"/>
+              </a:ext>
+            </a:extLst>
+          </p:cNvPr>
+          <p:cNvGrpSpPr/>
+          <p:nvPr/>
+        </p:nvGrpSpPr>
+        <p:grpSpPr>
+          <a:xfrm>
+            <a:off x="9456127" y="4299259"/>
+            <a:ext cx="1523710" cy="1523710"/>
+            <a:chOff x="832895" y="808517"/>
+            <a:chExt cx="2324715" cy="2324715"/>
+          </a:xfrm>
+        </p:grpSpPr>
+        <p:grpSp>
+          <p:nvGrpSpPr>
+            <p:cNvPr id="48" name="그룹 47">
+              <a:extLst>
+                <a:ext uri="{FF2B5EF4-FFF2-40B4-BE49-F238E27FC236}">
+                  <a16:creationId xmlns:a16="http://schemas.microsoft.com/office/drawing/2014/main" id="{32738404-1147-4F95-8DA2-8F369C02C539}"/>
+                </a:ext>
+              </a:extLst>
+            </p:cNvPr>
+            <p:cNvGrpSpPr/>
+            <p:nvPr/>
+          </p:nvGrpSpPr>
+          <p:grpSpPr>
+            <a:xfrm>
+              <a:off x="1369870" y="960607"/>
+              <a:ext cx="1428518" cy="2020534"/>
+              <a:chOff x="2288258" y="1445342"/>
+              <a:chExt cx="2940448" cy="4159045"/>
+            </a:xfrm>
+            <a:solidFill>
+              <a:schemeClr val="bg1"/>
+            </a:solidFill>
+            <a:effectLst>
+              <a:outerShdw blurRad="76200" dist="50800" dir="8100000" algn="t" rotWithShape="0">
+                <a:prstClr val="black">
+                  <a:alpha val="40000"/>
+                </a:prstClr>
+              </a:outerShdw>
+            </a:effectLst>
+          </p:grpSpPr>
+          <p:sp>
+            <p:nvSpPr>
+              <p:cNvPr id="50" name="직사각형 49">
+                <a:extLst>
+                  <a:ext uri="{FF2B5EF4-FFF2-40B4-BE49-F238E27FC236}">
+                    <a16:creationId xmlns:a16="http://schemas.microsoft.com/office/drawing/2014/main" id="{CD26DD9E-2A38-480B-AFDF-EF75A2319B41}"/>
+                  </a:ext>
+                </a:extLst>
+              </p:cNvPr>
+              <p:cNvSpPr/>
+              <p:nvPr/>
+            </p:nvSpPr>
+            <p:spPr>
+              <a:xfrm>
+                <a:off x="2288258" y="1445342"/>
+                <a:ext cx="762223" cy="4159045"/>
+              </a:xfrm>
+              <a:prstGeom prst="rect">
+                <a:avLst/>
+              </a:prstGeom>
+              <a:grpFill/>
+              <a:ln>
+                <a:noFill/>
+              </a:ln>
+              <a:effectLst/>
+            </p:spPr>
+            <p:style>
+              <a:lnRef idx="2">
+                <a:schemeClr val="accent1">
+                  <a:shade val="50000"/>
+                </a:schemeClr>
+              </a:lnRef>
+              <a:fillRef idx="1">
+                <a:schemeClr val="accent1"/>
+              </a:fillRef>
+              <a:effectRef idx="0">
+                <a:schemeClr val="accent1"/>
+              </a:effectRef>
+              <a:fontRef idx="minor">
+                <a:schemeClr val="lt1"/>
+              </a:fontRef>
+            </p:style>
+            <p:txBody>
+              <a:bodyPr rtlCol="0" anchor="ctr"/>
+              <a:lstStyle/>
+              <a:p>
+                <a:pPr algn="ctr"/>
+                <a:endParaRPr lang="ko-KR" altLang="en-US"/>
+              </a:p>
+            </p:txBody>
+          </p:sp>
+          <p:sp>
+            <p:nvSpPr>
+              <p:cNvPr id="51" name="자유형: 도형 50">
+                <a:extLst>
+                  <a:ext uri="{FF2B5EF4-FFF2-40B4-BE49-F238E27FC236}">
+                    <a16:creationId xmlns:a16="http://schemas.microsoft.com/office/drawing/2014/main" id="{89BC9CF5-2CAD-4440-BDBB-FC7B61AAD4DD}"/>
+                  </a:ext>
+                </a:extLst>
+              </p:cNvPr>
+              <p:cNvSpPr/>
+              <p:nvPr/>
+            </p:nvSpPr>
+            <p:spPr>
+              <a:xfrm>
+                <a:off x="3333405" y="1445342"/>
+                <a:ext cx="1895301" cy="4159045"/>
+              </a:xfrm>
+              <a:custGeom>
+                <a:avLst/>
+                <a:gdLst>
+                  <a:gd name="connsiteX0" fmla="*/ 448876 w 1639767"/>
+                  <a:gd name="connsiteY0" fmla="*/ 0 h 4167358"/>
+                  <a:gd name="connsiteX1" fmla="*/ 1521229 w 1639767"/>
+                  <a:gd name="connsiteY1" fmla="*/ 598528 h 4167358"/>
+                  <a:gd name="connsiteX2" fmla="*/ 1521229 w 1639767"/>
+                  <a:gd name="connsiteY2" fmla="*/ 3577143 h 4167358"/>
+                  <a:gd name="connsiteX3" fmla="*/ 465501 w 1639767"/>
+                  <a:gd name="connsiteY3" fmla="*/ 4167358 h 4167358"/>
+                  <a:gd name="connsiteX4" fmla="*/ 0 w 1639767"/>
+                  <a:gd name="connsiteY4" fmla="*/ 4167358 h 4167358"/>
+                  <a:gd name="connsiteX5" fmla="*/ 0 w 1639767"/>
+                  <a:gd name="connsiteY5" fmla="*/ 3425864 h 4167358"/>
+                  <a:gd name="connsiteX6" fmla="*/ 232195 w 1639767"/>
+                  <a:gd name="connsiteY6" fmla="*/ 3425864 h 4167358"/>
+                  <a:gd name="connsiteX7" fmla="*/ 912234 w 1639767"/>
+                  <a:gd name="connsiteY7" fmla="*/ 3045682 h 4167358"/>
+                  <a:gd name="connsiteX8" fmla="*/ 912234 w 1639767"/>
+                  <a:gd name="connsiteY8" fmla="*/ 1127031 h 4167358"/>
+                  <a:gd name="connsiteX9" fmla="*/ 221487 w 1639767"/>
+                  <a:gd name="connsiteY9" fmla="*/ 741494 h 4167358"/>
+                  <a:gd name="connsiteX10" fmla="*/ 0 w 1639767"/>
+                  <a:gd name="connsiteY10" fmla="*/ 742474 h 4167358"/>
+                  <a:gd name="connsiteX11" fmla="*/ 0 w 1639767"/>
+                  <a:gd name="connsiteY11" fmla="*/ 1986 h 4167358"/>
+                </a:gdLst>
+                <a:ahLst/>
+                <a:cxnLst>
+                  <a:cxn ang="0">
+                    <a:pos x="connsiteX0" y="connsiteY0"/>
+                  </a:cxn>
+                  <a:cxn ang="0">
+                    <a:pos x="connsiteX1" y="connsiteY1"/>
+                  </a:cxn>
+                  <a:cxn ang="0">
+                    <a:pos x="connsiteX2" y="connsiteY2"/>
+                  </a:cxn>
+                  <a:cxn ang="0">
+                    <a:pos x="connsiteX3" y="connsiteY3"/>
+                  </a:cxn>
+                  <a:cxn ang="0">
+                    <a:pos x="connsiteX4" y="connsiteY4"/>
+                  </a:cxn>
+                  <a:cxn ang="0">
+                    <a:pos x="connsiteX5" y="connsiteY5"/>
+                  </a:cxn>
+                  <a:cxn ang="0">
+                    <a:pos x="connsiteX6" y="connsiteY6"/>
+                  </a:cxn>
+                  <a:cxn ang="0">
+                    <a:pos x="connsiteX7" y="connsiteY7"/>
+                  </a:cxn>
+                  <a:cxn ang="0">
+                    <a:pos x="connsiteX8" y="connsiteY8"/>
+                  </a:cxn>
+                  <a:cxn ang="0">
+                    <a:pos x="connsiteX9" y="connsiteY9"/>
+                  </a:cxn>
+                  <a:cxn ang="0">
+                    <a:pos x="connsiteX10" y="connsiteY10"/>
+                  </a:cxn>
+                  <a:cxn ang="0">
+                    <a:pos x="connsiteX11" y="connsiteY11"/>
+                  </a:cxn>
+                </a:cxnLst>
+                <a:rect l="l" t="t" r="r" b="b"/>
+                <a:pathLst>
+                  <a:path w="1639767" h="4167358">
+                    <a:moveTo>
+                      <a:pt x="448876" y="0"/>
+                    </a:moveTo>
+                    <a:cubicBezTo>
+                      <a:pt x="1024225" y="8313"/>
+                      <a:pt x="1371600" y="147870"/>
+                      <a:pt x="1521229" y="598528"/>
+                    </a:cubicBezTo>
+                    <a:cubicBezTo>
+                      <a:pt x="1670858" y="1109262"/>
+                      <a:pt x="1687484" y="3041471"/>
+                      <a:pt x="1521229" y="3577143"/>
+                    </a:cubicBezTo>
+                    <a:cubicBezTo>
+                      <a:pt x="1330036" y="4119240"/>
+                      <a:pt x="1032537" y="4142420"/>
+                      <a:pt x="465501" y="4167358"/>
+                    </a:cubicBezTo>
+                    <a:lnTo>
+                      <a:pt x="0" y="4167358"/>
+                    </a:lnTo>
+                    <a:lnTo>
+                      <a:pt x="0" y="3425864"/>
+                    </a:lnTo>
+                    <a:lnTo>
+                      <a:pt x="232195" y="3425864"/>
+                    </a:lnTo>
+                    <a:cubicBezTo>
+                      <a:pt x="597447" y="3409801"/>
+                      <a:pt x="789078" y="3394869"/>
+                      <a:pt x="912234" y="3045682"/>
+                    </a:cubicBezTo>
+                    <a:cubicBezTo>
+                      <a:pt x="1019326" y="2700633"/>
+                      <a:pt x="1008616" y="1456016"/>
+                      <a:pt x="912234" y="1127031"/>
+                    </a:cubicBezTo>
+                    <a:cubicBezTo>
+                      <a:pt x="815852" y="836743"/>
+                      <a:pt x="592093" y="746849"/>
+                      <a:pt x="221487" y="741494"/>
+                    </a:cubicBezTo>
+                    <a:lnTo>
+                      <a:pt x="0" y="742474"/>
+                    </a:lnTo>
+                    <a:lnTo>
+                      <a:pt x="0" y="1986"/>
+                    </a:lnTo>
+                    <a:close/>
+                  </a:path>
+                </a:pathLst>
+              </a:custGeom>
+              <a:grpFill/>
+              <a:ln>
+                <a:noFill/>
+              </a:ln>
+              <a:effectLst/>
+            </p:spPr>
+            <p:style>
+              <a:lnRef idx="2">
+                <a:schemeClr val="accent1">
+                  <a:shade val="50000"/>
+                </a:schemeClr>
+              </a:lnRef>
+              <a:fillRef idx="1">
+                <a:schemeClr val="accent1"/>
+              </a:fillRef>
+              <a:effectRef idx="0">
+                <a:schemeClr val="accent1"/>
+              </a:effectRef>
+              <a:fontRef idx="minor">
+                <a:schemeClr val="lt1"/>
+              </a:fontRef>
+            </p:style>
+            <p:txBody>
+              <a:bodyPr wrap="square" rtlCol="0" anchor="ctr">
+                <a:noAutofit/>
+              </a:bodyPr>
+              <a:lstStyle/>
+              <a:p>
+                <a:pPr algn="ctr"/>
+                <a:endParaRPr lang="ko-KR" altLang="en-US"/>
+              </a:p>
+            </p:txBody>
+          </p:sp>
+        </p:grpSp>
+        <p:sp>
+          <p:nvSpPr>
+            <p:cNvPr id="49" name="사각형: 둥근 모서리 48">
+              <a:extLst>
+                <a:ext uri="{FF2B5EF4-FFF2-40B4-BE49-F238E27FC236}">
+                  <a16:creationId xmlns:a16="http://schemas.microsoft.com/office/drawing/2014/main" id="{1D102F4F-2953-4D17-AB4A-4BE4439CF311}"/>
+                </a:ext>
+              </a:extLst>
+            </p:cNvPr>
+            <p:cNvSpPr/>
+            <p:nvPr/>
+          </p:nvSpPr>
+          <p:spPr>
+            <a:xfrm>
+              <a:off x="832895" y="808517"/>
+              <a:ext cx="2324715" cy="2324715"/>
+            </a:xfrm>
+            <a:prstGeom prst="roundRect">
+              <a:avLst/>
+            </a:prstGeom>
+            <a:noFill/>
+            <a:ln>
+              <a:noFill/>
+            </a:ln>
+            <a:effectLst/>
+          </p:spPr>
+          <p:style>
+            <a:lnRef idx="2">
+              <a:schemeClr val="accent1">
+                <a:shade val="50000"/>
+              </a:schemeClr>
+            </a:lnRef>
+            <a:fillRef idx="1">
+              <a:schemeClr val="accent1"/>
+            </a:fillRef>
+            <a:effectRef idx="0">
+              <a:schemeClr val="accent1"/>
+            </a:effectRef>
+            <a:fontRef idx="minor">
+              <a:schemeClr val="lt1"/>
+            </a:fontRef>
+          </p:style>
+          <p:txBody>
+            <a:bodyPr rtlCol="0" anchor="ctr"/>
+            <a:lstStyle/>
+            <a:p>
+              <a:pPr algn="ctr"/>
+              <a:endParaRPr lang="ko-KR" altLang="en-US"/>
+            </a:p>
+          </p:txBody>
+        </p:sp>
+      </p:grpSp>
+      <p:sp>
+        <p:nvSpPr>
+          <p:cNvPr id="52" name="직사각형 51">
+            <a:extLst>
+              <a:ext uri="{FF2B5EF4-FFF2-40B4-BE49-F238E27FC236}">
+                <a16:creationId xmlns:a16="http://schemas.microsoft.com/office/drawing/2014/main" id="{A3128179-3B9E-41BF-9698-BA82CD1ADC64}"/>
+              </a:ext>
+            </a:extLst>
+          </p:cNvPr>
+          <p:cNvSpPr/>
+          <p:nvPr/>
+        </p:nvSpPr>
+        <p:spPr>
+          <a:xfrm>
+            <a:off x="0" y="0"/>
+            <a:ext cx="3297270" cy="6858000"/>
+          </a:xfrm>
+          <a:prstGeom prst="rect">
+            <a:avLst/>
+          </a:prstGeom>
+          <a:solidFill>
+            <a:schemeClr val="bg2">
+              <a:lumMod val="90000"/>
+            </a:schemeClr>
+          </a:solidFill>
+          <a:ln>
+            <a:noFill/>
+          </a:ln>
+        </p:spPr>
+        <p:style>
+          <a:lnRef idx="2">
+            <a:schemeClr val="accent1">
+              <a:shade val="50000"/>
+            </a:schemeClr>
+          </a:lnRef>
+          <a:fillRef idx="1">
+            <a:schemeClr val="accent1"/>
+          </a:fillRef>
+          <a:effectRef idx="0">
+            <a:schemeClr val="accent1"/>
+          </a:effectRef>
+          <a:fontRef idx="minor">
+            <a:schemeClr val="lt1"/>
+          </a:fontRef>
+        </p:style>
+        <p:txBody>
+          <a:bodyPr rtlCol="0" anchor="ctr"/>
+          <a:lstStyle/>
+          <a:p>
+            <a:pPr algn="ctr"/>
+            <a:endParaRPr lang="ko-KR" altLang="en-US"/>
+          </a:p>
+        </p:txBody>
+      </p:sp>
+      <p:sp>
+        <p:nvSpPr>
+          <p:cNvPr id="55" name="TextBox 54">
+            <a:extLst>
+              <a:ext uri="{FF2B5EF4-FFF2-40B4-BE49-F238E27FC236}">
+                <a16:creationId xmlns:a16="http://schemas.microsoft.com/office/drawing/2014/main" id="{EF911878-A15B-4BE3-B0CC-5BBF8B441E75}"/>
+              </a:ext>
+            </a:extLst>
+          </p:cNvPr>
+          <p:cNvSpPr txBox="1"/>
+          <p:nvPr/>
+        </p:nvSpPr>
+        <p:spPr>
+          <a:xfrm>
+            <a:off x="311794" y="690450"/>
+            <a:ext cx="2673681" cy="523220"/>
+          </a:xfrm>
+          <a:prstGeom prst="rect">
+            <a:avLst/>
+          </a:prstGeom>
+          <a:noFill/>
+        </p:spPr>
+        <p:txBody>
+          <a:bodyPr wrap="none" rtlCol="0">
+            <a:spAutoFit/>
+          </a:bodyPr>
+          <a:lstStyle/>
+          <a:p>
+            <a:pPr algn="ctr"/>
+            <a:r>
+              <a:rPr lang="en-US" altLang="ko-KR" sz="2800" dirty="0"/>
+              <a:t>Appx resources</a:t>
+            </a:r>
+            <a:endParaRPr lang="ko-KR" altLang="en-US" sz="2800" dirty="0"/>
+          </a:p>
+        </p:txBody>
+      </p:sp>
+      <p:sp>
+        <p:nvSpPr>
+          <p:cNvPr id="56" name="TextBox 55">
+            <a:extLst>
+              <a:ext uri="{FF2B5EF4-FFF2-40B4-BE49-F238E27FC236}">
+                <a16:creationId xmlns:a16="http://schemas.microsoft.com/office/drawing/2014/main" id="{BD4B6CE6-F774-4B80-86BD-DF127A981369}"/>
+              </a:ext>
+            </a:extLst>
+          </p:cNvPr>
+          <p:cNvSpPr txBox="1"/>
+          <p:nvPr/>
+        </p:nvSpPr>
+        <p:spPr>
+          <a:xfrm>
+            <a:off x="25346" y="1365865"/>
+            <a:ext cx="3246594" cy="276999"/>
+          </a:xfrm>
+          <a:prstGeom prst="rect">
+            <a:avLst/>
+          </a:prstGeom>
+          <a:noFill/>
+        </p:spPr>
+        <p:txBody>
+          <a:bodyPr wrap="none" rtlCol="0">
+            <a:spAutoFit/>
+          </a:bodyPr>
+          <a:lstStyle/>
+          <a:p>
+            <a:pPr algn="ctr"/>
+            <a:r>
+              <a:rPr lang="en-US" altLang="ko-KR" sz="1200" dirty="0"/>
+              <a:t>Those resources are required to build .appx</a:t>
+            </a:r>
+            <a:endParaRPr lang="ko-KR" altLang="en-US" sz="1200" dirty="0"/>
+          </a:p>
+        </p:txBody>
+      </p:sp>
+      <p:graphicFrame>
+        <p:nvGraphicFramePr>
+          <p:cNvPr id="58" name="표 58">
+            <a:extLst>
+              <a:ext uri="{FF2B5EF4-FFF2-40B4-BE49-F238E27FC236}">
+                <a16:creationId xmlns:a16="http://schemas.microsoft.com/office/drawing/2014/main" id="{B18FC549-5585-4D47-9D69-213A8591FAF3}"/>
+              </a:ext>
+            </a:extLst>
+          </p:cNvPr>
+          <p:cNvGraphicFramePr>
+            <a:graphicFrameLocks noGrp="1"/>
+          </p:cNvGraphicFramePr>
+          <p:nvPr>
+            <p:extLst>
+              <p:ext uri="{D42A27DB-BD31-4B8C-83A1-F6EECF244321}">
+                <p14:modId xmlns:p14="http://schemas.microsoft.com/office/powerpoint/2010/main" val="3913072341"/>
+              </p:ext>
+            </p:extLst>
+          </p:nvPr>
+        </p:nvGraphicFramePr>
+        <p:xfrm>
+          <a:off x="211759" y="2050352"/>
+          <a:ext cx="2873750" cy="2496543"/>
+        </p:xfrm>
+        <a:graphic>
+          <a:graphicData uri="http://schemas.openxmlformats.org/drawingml/2006/table">
+            <a:tbl>
+              <a:tblPr firstRow="1" bandRow="1">
+                <a:tableStyleId>{2D5ABB26-0587-4C30-8999-92F81FD0307C}</a:tableStyleId>
+              </a:tblPr>
+              <a:tblGrid>
+                <a:gridCol w="1436875">
+                  <a:extLst>
+                    <a:ext uri="{9D8B030D-6E8A-4147-A177-3AD203B41FA5}">
+                      <a16:colId xmlns:a16="http://schemas.microsoft.com/office/drawing/2014/main" val="2405161208"/>
+                    </a:ext>
+                  </a:extLst>
+                </a:gridCol>
+                <a:gridCol w="1436875">
+                  <a:extLst>
+                    <a:ext uri="{9D8B030D-6E8A-4147-A177-3AD203B41FA5}">
+                      <a16:colId xmlns:a16="http://schemas.microsoft.com/office/drawing/2014/main" val="206973415"/>
+                    </a:ext>
+                  </a:extLst>
+                </a:gridCol>
+              </a:tblGrid>
+              <a:tr h="313264">
+                <a:tc>
+                  <a:txBody>
+                    <a:bodyPr/>
+                    <a:lstStyle/>
+                    <a:p>
+                      <a:pPr latinLnBrk="1"/>
+                      <a:r>
+                        <a:rPr lang="en-US" altLang="ko-KR" sz="1000" b="1" dirty="0" err="1"/>
+                        <a:t>Resouece</a:t>
+                      </a:r>
+                      <a:r>
+                        <a:rPr lang="en-US" altLang="ko-KR" sz="1000" b="1" dirty="0"/>
+                        <a:t> Name</a:t>
+                      </a:r>
+                      <a:endParaRPr lang="ko-KR" altLang="en-US" sz="1000" b="1" dirty="0"/>
+                    </a:p>
+                  </a:txBody>
+                  <a:tcPr/>
+                </a:tc>
+                <a:tc>
+                  <a:txBody>
+                    <a:bodyPr/>
+                    <a:lstStyle/>
+                    <a:p>
+                      <a:pPr algn="ctr" latinLnBrk="1"/>
+                      <a:r>
+                        <a:rPr lang="en-US" altLang="ko-KR" sz="1000" b="1" dirty="0"/>
+                        <a:t>Size (pixel)</a:t>
+                      </a:r>
+                      <a:endParaRPr lang="ko-KR" altLang="en-US" sz="1000" b="1" dirty="0"/>
+                    </a:p>
+                  </a:txBody>
+                  <a:tcPr/>
+                </a:tc>
+                <a:extLst>
+                  <a:ext uri="{0D108BD9-81ED-4DB2-BD59-A6C34878D82A}">
+                    <a16:rowId xmlns:a16="http://schemas.microsoft.com/office/drawing/2014/main" val="1559410549"/>
+                  </a:ext>
+                </a:extLst>
+              </a:tr>
+              <a:tr h="311897">
+                <a:tc>
+                  <a:txBody>
+                    <a:bodyPr/>
+                    <a:lstStyle/>
+                    <a:p>
+                      <a:pPr latinLnBrk="1"/>
+                      <a:r>
+                        <a:rPr lang="en-US" altLang="ko-KR" sz="1000" dirty="0"/>
+                        <a:t>Square44x44Logo</a:t>
+                      </a:r>
+                      <a:endParaRPr lang="ko-KR" altLang="en-US" sz="1000" dirty="0"/>
+                    </a:p>
+                  </a:txBody>
+                  <a:tcPr/>
+                </a:tc>
+                <a:tc>
+                  <a:txBody>
+                    <a:bodyPr/>
+                    <a:lstStyle/>
+                    <a:p>
+                      <a:pPr algn="ctr" latinLnBrk="1"/>
+                      <a:r>
+                        <a:rPr lang="en-US" altLang="ko-KR" sz="1000" dirty="0"/>
+                        <a:t>44x44</a:t>
+                      </a:r>
+                      <a:endParaRPr lang="ko-KR" altLang="en-US" sz="1000" dirty="0"/>
+                    </a:p>
+                  </a:txBody>
+                  <a:tcPr/>
+                </a:tc>
+                <a:extLst>
+                  <a:ext uri="{0D108BD9-81ED-4DB2-BD59-A6C34878D82A}">
+                    <a16:rowId xmlns:a16="http://schemas.microsoft.com/office/drawing/2014/main" val="2689245469"/>
+                  </a:ext>
+                </a:extLst>
+              </a:tr>
+              <a:tr h="311897">
+                <a:tc>
+                  <a:txBody>
+                    <a:bodyPr/>
+                    <a:lstStyle/>
+                    <a:p>
+                      <a:pPr latinLnBrk="1"/>
+                      <a:r>
+                        <a:rPr lang="en-US" altLang="ko-KR" sz="1000" dirty="0"/>
+                        <a:t>Square150x150Logo</a:t>
+                      </a:r>
+                      <a:endParaRPr lang="ko-KR" altLang="en-US" sz="1000" dirty="0"/>
+                    </a:p>
+                  </a:txBody>
+                  <a:tcPr/>
+                </a:tc>
+                <a:tc>
+                  <a:txBody>
+                    <a:bodyPr/>
+                    <a:lstStyle/>
+                    <a:p>
+                      <a:pPr algn="ctr" latinLnBrk="1"/>
+                      <a:r>
+                        <a:rPr lang="en-US" altLang="ko-KR" sz="1000" dirty="0"/>
+                        <a:t>150x150</a:t>
+                      </a:r>
+                      <a:endParaRPr lang="ko-KR" altLang="en-US" sz="1000" dirty="0"/>
+                    </a:p>
+                  </a:txBody>
+                  <a:tcPr/>
+                </a:tc>
+                <a:extLst>
+                  <a:ext uri="{0D108BD9-81ED-4DB2-BD59-A6C34878D82A}">
+                    <a16:rowId xmlns:a16="http://schemas.microsoft.com/office/drawing/2014/main" val="2611870929"/>
+                  </a:ext>
+                </a:extLst>
+              </a:tr>
+              <a:tr h="311897">
+                <a:tc>
+                  <a:txBody>
+                    <a:bodyPr/>
+                    <a:lstStyle/>
+                    <a:p>
+                      <a:pPr latinLnBrk="1"/>
+                      <a:r>
+                        <a:rPr lang="en-US" altLang="ko-KR" sz="1000" dirty="0"/>
+                        <a:t>Wide310x150Logo</a:t>
+                      </a:r>
+                      <a:endParaRPr lang="ko-KR" altLang="en-US" sz="1000" dirty="0"/>
+                    </a:p>
+                  </a:txBody>
+                  <a:tcPr/>
+                </a:tc>
+                <a:tc>
+                  <a:txBody>
+                    <a:bodyPr/>
+                    <a:lstStyle/>
+                    <a:p>
+                      <a:pPr algn="ctr" latinLnBrk="1"/>
+                      <a:r>
+                        <a:rPr lang="en-US" altLang="ko-KR" sz="1000" dirty="0"/>
+                        <a:t>310x150</a:t>
+                      </a:r>
+                      <a:endParaRPr lang="ko-KR" altLang="en-US" sz="1000" dirty="0"/>
+                    </a:p>
+                  </a:txBody>
+                  <a:tcPr/>
+                </a:tc>
+                <a:extLst>
+                  <a:ext uri="{0D108BD9-81ED-4DB2-BD59-A6C34878D82A}">
+                    <a16:rowId xmlns:a16="http://schemas.microsoft.com/office/drawing/2014/main" val="1674631273"/>
+                  </a:ext>
+                </a:extLst>
+              </a:tr>
+              <a:tr h="311897">
+                <a:tc>
+                  <a:txBody>
+                    <a:bodyPr/>
+                    <a:lstStyle/>
+                    <a:p>
+                      <a:pPr latinLnBrk="1"/>
+                      <a:r>
+                        <a:rPr lang="en-US" altLang="ko-KR" sz="1000" dirty="0" err="1"/>
+                        <a:t>StoreLogo</a:t>
+                      </a:r>
+                      <a:endParaRPr lang="ko-KR" altLang="en-US" sz="1000" dirty="0"/>
+                    </a:p>
+                  </a:txBody>
+                  <a:tcPr/>
+                </a:tc>
+                <a:tc>
+                  <a:txBody>
+                    <a:bodyPr/>
+                    <a:lstStyle/>
+                    <a:p>
+                      <a:pPr algn="ctr" latinLnBrk="1"/>
+                      <a:r>
+                        <a:rPr lang="en-US" altLang="ko-KR" sz="1000" dirty="0"/>
+                        <a:t>200x200</a:t>
+                      </a:r>
+                      <a:endParaRPr lang="ko-KR" altLang="en-US" sz="1000" dirty="0"/>
+                    </a:p>
+                  </a:txBody>
+                  <a:tcPr/>
+                </a:tc>
+                <a:extLst>
+                  <a:ext uri="{0D108BD9-81ED-4DB2-BD59-A6C34878D82A}">
+                    <a16:rowId xmlns:a16="http://schemas.microsoft.com/office/drawing/2014/main" val="451108528"/>
+                  </a:ext>
+                </a:extLst>
+              </a:tr>
+              <a:tr h="311897">
+                <a:tc>
+                  <a:txBody>
+                    <a:bodyPr/>
+                    <a:lstStyle/>
+                    <a:p>
+                      <a:pPr latinLnBrk="1"/>
+                      <a:r>
+                        <a:rPr lang="en-US" altLang="ko-KR" sz="1000" dirty="0" err="1"/>
+                        <a:t>SmallTile</a:t>
+                      </a:r>
+                      <a:endParaRPr lang="ko-KR" altLang="en-US" sz="1000" dirty="0"/>
+                    </a:p>
+                  </a:txBody>
+                  <a:tcPr/>
+                </a:tc>
+                <a:tc>
+                  <a:txBody>
+                    <a:bodyPr/>
+                    <a:lstStyle/>
+                    <a:p>
+                      <a:pPr algn="ctr" latinLnBrk="1"/>
+                      <a:r>
+                        <a:rPr lang="en-US" altLang="ko-KR" sz="1000" dirty="0"/>
+                        <a:t>71x71</a:t>
+                      </a:r>
+                      <a:endParaRPr lang="ko-KR" altLang="en-US" sz="1000" dirty="0"/>
+                    </a:p>
+                  </a:txBody>
+                  <a:tcPr/>
+                </a:tc>
+                <a:extLst>
+                  <a:ext uri="{0D108BD9-81ED-4DB2-BD59-A6C34878D82A}">
+                    <a16:rowId xmlns:a16="http://schemas.microsoft.com/office/drawing/2014/main" val="2001919522"/>
+                  </a:ext>
+                </a:extLst>
+              </a:tr>
+              <a:tr h="311897">
+                <a:tc>
+                  <a:txBody>
+                    <a:bodyPr/>
+                    <a:lstStyle/>
+                    <a:p>
+                      <a:pPr latinLnBrk="1"/>
+                      <a:r>
+                        <a:rPr lang="en-US" altLang="ko-KR" sz="1000" dirty="0" err="1"/>
+                        <a:t>LargeTile</a:t>
+                      </a:r>
+                      <a:endParaRPr lang="ko-KR" altLang="en-US" sz="1000" dirty="0"/>
+                    </a:p>
+                  </a:txBody>
+                  <a:tcPr/>
+                </a:tc>
+                <a:tc>
+                  <a:txBody>
+                    <a:bodyPr/>
+                    <a:lstStyle/>
+                    <a:p>
+                      <a:pPr algn="ctr" latinLnBrk="1"/>
+                      <a:r>
+                        <a:rPr lang="en-US" altLang="ko-KR" sz="1000" dirty="0"/>
+                        <a:t>310x310</a:t>
+                      </a:r>
+                      <a:endParaRPr lang="ko-KR" altLang="en-US" sz="1000" dirty="0"/>
+                    </a:p>
+                  </a:txBody>
+                  <a:tcPr/>
+                </a:tc>
+                <a:extLst>
+                  <a:ext uri="{0D108BD9-81ED-4DB2-BD59-A6C34878D82A}">
+                    <a16:rowId xmlns:a16="http://schemas.microsoft.com/office/drawing/2014/main" val="2831332688"/>
+                  </a:ext>
+                </a:extLst>
+              </a:tr>
+              <a:tr h="311897">
+                <a:tc>
+                  <a:txBody>
+                    <a:bodyPr/>
+                    <a:lstStyle/>
+                    <a:p>
+                      <a:pPr latinLnBrk="1"/>
+                      <a:r>
+                        <a:rPr lang="en-US" altLang="ko-KR" sz="1000" dirty="0" err="1"/>
+                        <a:t>SplashScreen</a:t>
+                      </a:r>
+                      <a:endParaRPr lang="ko-KR" altLang="en-US" sz="1000" dirty="0"/>
+                    </a:p>
+                  </a:txBody>
+                  <a:tcPr/>
+                </a:tc>
+                <a:tc>
+                  <a:txBody>
+                    <a:bodyPr/>
+                    <a:lstStyle/>
+                    <a:p>
+                      <a:pPr algn="ctr" latinLnBrk="1"/>
+                      <a:r>
+                        <a:rPr lang="en-US" altLang="ko-KR" sz="1000" dirty="0"/>
+                        <a:t>2480x1200</a:t>
+                      </a:r>
+                      <a:endParaRPr lang="ko-KR" altLang="en-US" sz="1000" dirty="0"/>
+                    </a:p>
+                  </a:txBody>
+                  <a:tcPr/>
+                </a:tc>
+                <a:extLst>
+                  <a:ext uri="{0D108BD9-81ED-4DB2-BD59-A6C34878D82A}">
+                    <a16:rowId xmlns:a16="http://schemas.microsoft.com/office/drawing/2014/main" val="3013384485"/>
+                  </a:ext>
+                </a:extLst>
+              </a:tr>
+            </a:tbl>
+          </a:graphicData>
+        </a:graphic>
+      </p:graphicFrame>
+      <p:sp>
+        <p:nvSpPr>
+          <p:cNvPr id="59" name="TextBox 58">
+            <a:extLst>
+              <a:ext uri="{FF2B5EF4-FFF2-40B4-BE49-F238E27FC236}">
+                <a16:creationId xmlns:a16="http://schemas.microsoft.com/office/drawing/2014/main" id="{DF0E92FF-CF74-45D9-93AB-2AED970A2FCD}"/>
+              </a:ext>
+            </a:extLst>
+          </p:cNvPr>
+          <p:cNvSpPr txBox="1"/>
+          <p:nvPr/>
+        </p:nvSpPr>
+        <p:spPr>
+          <a:xfrm>
+            <a:off x="3998623" y="3008140"/>
+            <a:ext cx="1245470" cy="369332"/>
+          </a:xfrm>
+          <a:prstGeom prst="rect">
+            <a:avLst/>
+          </a:prstGeom>
+          <a:noFill/>
+        </p:spPr>
+        <p:txBody>
+          <a:bodyPr wrap="none" rtlCol="0">
+            <a:spAutoFit/>
+          </a:bodyPr>
+          <a:lstStyle/>
+          <a:p>
+            <a:pPr algn="ctr"/>
+            <a:r>
+              <a:rPr lang="en-US" altLang="ko-KR" dirty="0" err="1"/>
+              <a:t>StoreLogo</a:t>
+            </a:r>
+            <a:endParaRPr lang="ko-KR" altLang="en-US" dirty="0"/>
+          </a:p>
+        </p:txBody>
+      </p:sp>
+      <p:sp>
+        <p:nvSpPr>
+          <p:cNvPr id="60" name="직사각형 59">
+            <a:extLst>
+              <a:ext uri="{FF2B5EF4-FFF2-40B4-BE49-F238E27FC236}">
+                <a16:creationId xmlns:a16="http://schemas.microsoft.com/office/drawing/2014/main" id="{AA2FEB44-D3F3-46EB-994A-62B9C26BF5D8}"/>
+              </a:ext>
+            </a:extLst>
+          </p:cNvPr>
+          <p:cNvSpPr/>
+          <p:nvPr/>
+        </p:nvSpPr>
+        <p:spPr>
+          <a:xfrm>
+            <a:off x="3664453" y="3667939"/>
+            <a:ext cx="1905000" cy="1905000"/>
+          </a:xfrm>
+          <a:prstGeom prst="rect">
+            <a:avLst/>
+          </a:prstGeom>
+          <a:solidFill>
+            <a:srgbClr val="2F71E9"/>
+          </a:solidFill>
+          <a:ln>
+            <a:noFill/>
+          </a:ln>
+        </p:spPr>
+        <p:style>
+          <a:lnRef idx="2">
+            <a:schemeClr val="accent1">
+              <a:shade val="50000"/>
+            </a:schemeClr>
+          </a:lnRef>
+          <a:fillRef idx="1">
+            <a:schemeClr val="accent1"/>
+          </a:fillRef>
+          <a:effectRef idx="0">
+            <a:schemeClr val="accent1"/>
+          </a:effectRef>
+          <a:fontRef idx="minor">
+            <a:schemeClr val="lt1"/>
+          </a:fontRef>
+        </p:style>
+        <p:txBody>
+          <a:bodyPr rtlCol="0" anchor="ctr"/>
+          <a:lstStyle/>
+          <a:p>
+            <a:pPr algn="ctr"/>
+            <a:endParaRPr lang="ko-KR" altLang="en-US" dirty="0"/>
+          </a:p>
+        </p:txBody>
+      </p:sp>
+      <p:grpSp>
+        <p:nvGrpSpPr>
+          <p:cNvPr id="61" name="그룹 60">
+            <a:extLst>
+              <a:ext uri="{FF2B5EF4-FFF2-40B4-BE49-F238E27FC236}">
+                <a16:creationId xmlns:a16="http://schemas.microsoft.com/office/drawing/2014/main" id="{94CC19E5-CACC-47C5-80E4-868944E34CDC}"/>
+              </a:ext>
+            </a:extLst>
+          </p:cNvPr>
+          <p:cNvGrpSpPr/>
+          <p:nvPr/>
+        </p:nvGrpSpPr>
+        <p:grpSpPr>
+          <a:xfrm>
+            <a:off x="4058981" y="4059278"/>
+            <a:ext cx="1122322" cy="1122322"/>
+            <a:chOff x="832895" y="808517"/>
+            <a:chExt cx="2324715" cy="2324715"/>
+          </a:xfrm>
+        </p:grpSpPr>
+        <p:grpSp>
+          <p:nvGrpSpPr>
+            <p:cNvPr id="62" name="그룹 61">
+              <a:extLst>
+                <a:ext uri="{FF2B5EF4-FFF2-40B4-BE49-F238E27FC236}">
+                  <a16:creationId xmlns:a16="http://schemas.microsoft.com/office/drawing/2014/main" id="{BF6395E0-1BA2-4EEF-884E-1C1470D406E5}"/>
+                </a:ext>
+              </a:extLst>
+            </p:cNvPr>
+            <p:cNvGrpSpPr/>
+            <p:nvPr/>
+          </p:nvGrpSpPr>
+          <p:grpSpPr>
+            <a:xfrm>
+              <a:off x="1369870" y="960607"/>
+              <a:ext cx="1428518" cy="2020534"/>
+              <a:chOff x="2288258" y="1445342"/>
+              <a:chExt cx="2940448" cy="4159045"/>
+            </a:xfrm>
+            <a:solidFill>
+              <a:schemeClr val="bg1"/>
+            </a:solidFill>
+            <a:effectLst>
+              <a:outerShdw blurRad="76200" dist="50800" dir="8100000" algn="t" rotWithShape="0">
+                <a:prstClr val="black">
+                  <a:alpha val="40000"/>
+                </a:prstClr>
+              </a:outerShdw>
+            </a:effectLst>
+          </p:grpSpPr>
+          <p:sp>
+            <p:nvSpPr>
+              <p:cNvPr id="64" name="직사각형 63">
+                <a:extLst>
+                  <a:ext uri="{FF2B5EF4-FFF2-40B4-BE49-F238E27FC236}">
+                    <a16:creationId xmlns:a16="http://schemas.microsoft.com/office/drawing/2014/main" id="{42D5EA48-8A3F-4CC9-AD9C-4EBCBBF792E6}"/>
+                  </a:ext>
+                </a:extLst>
+              </p:cNvPr>
+              <p:cNvSpPr/>
+              <p:nvPr/>
+            </p:nvSpPr>
+            <p:spPr>
+              <a:xfrm>
+                <a:off x="2288258" y="1445342"/>
+                <a:ext cx="762223" cy="4159045"/>
+              </a:xfrm>
+              <a:prstGeom prst="rect">
+                <a:avLst/>
+              </a:prstGeom>
+              <a:grpFill/>
+              <a:ln>
+                <a:noFill/>
+              </a:ln>
+              <a:effectLst/>
+            </p:spPr>
+            <p:style>
+              <a:lnRef idx="2">
+                <a:schemeClr val="accent1">
+                  <a:shade val="50000"/>
+                </a:schemeClr>
+              </a:lnRef>
+              <a:fillRef idx="1">
+                <a:schemeClr val="accent1"/>
+              </a:fillRef>
+              <a:effectRef idx="0">
+                <a:schemeClr val="accent1"/>
+              </a:effectRef>
+              <a:fontRef idx="minor">
+                <a:schemeClr val="lt1"/>
+              </a:fontRef>
+            </p:style>
+            <p:txBody>
+              <a:bodyPr rtlCol="0" anchor="ctr"/>
+              <a:lstStyle/>
+              <a:p>
+                <a:pPr algn="ctr"/>
+                <a:endParaRPr lang="ko-KR" altLang="en-US"/>
+              </a:p>
+            </p:txBody>
+          </p:sp>
+          <p:sp>
+            <p:nvSpPr>
+              <p:cNvPr id="65" name="자유형: 도형 64">
+                <a:extLst>
+                  <a:ext uri="{FF2B5EF4-FFF2-40B4-BE49-F238E27FC236}">
+                    <a16:creationId xmlns:a16="http://schemas.microsoft.com/office/drawing/2014/main" id="{98C4FDF5-3953-4B9E-9567-BD903D701423}"/>
+                  </a:ext>
+                </a:extLst>
+              </p:cNvPr>
+              <p:cNvSpPr/>
+              <p:nvPr/>
+            </p:nvSpPr>
+            <p:spPr>
+              <a:xfrm>
+                <a:off x="3333405" y="1445342"/>
+                <a:ext cx="1895301" cy="4159045"/>
+              </a:xfrm>
+              <a:custGeom>
+                <a:avLst/>
+                <a:gdLst>
+                  <a:gd name="connsiteX0" fmla="*/ 448876 w 1639767"/>
+                  <a:gd name="connsiteY0" fmla="*/ 0 h 4167358"/>
+                  <a:gd name="connsiteX1" fmla="*/ 1521229 w 1639767"/>
+                  <a:gd name="connsiteY1" fmla="*/ 598528 h 4167358"/>
+                  <a:gd name="connsiteX2" fmla="*/ 1521229 w 1639767"/>
+                  <a:gd name="connsiteY2" fmla="*/ 3577143 h 4167358"/>
+                  <a:gd name="connsiteX3" fmla="*/ 465501 w 1639767"/>
+                  <a:gd name="connsiteY3" fmla="*/ 4167358 h 4167358"/>
+                  <a:gd name="connsiteX4" fmla="*/ 0 w 1639767"/>
+                  <a:gd name="connsiteY4" fmla="*/ 4167358 h 4167358"/>
+                  <a:gd name="connsiteX5" fmla="*/ 0 w 1639767"/>
+                  <a:gd name="connsiteY5" fmla="*/ 3425864 h 4167358"/>
+                  <a:gd name="connsiteX6" fmla="*/ 232195 w 1639767"/>
+                  <a:gd name="connsiteY6" fmla="*/ 3425864 h 4167358"/>
+                  <a:gd name="connsiteX7" fmla="*/ 912234 w 1639767"/>
+                  <a:gd name="connsiteY7" fmla="*/ 3045682 h 4167358"/>
+                  <a:gd name="connsiteX8" fmla="*/ 912234 w 1639767"/>
+                  <a:gd name="connsiteY8" fmla="*/ 1127031 h 4167358"/>
+                  <a:gd name="connsiteX9" fmla="*/ 221487 w 1639767"/>
+                  <a:gd name="connsiteY9" fmla="*/ 741494 h 4167358"/>
+                  <a:gd name="connsiteX10" fmla="*/ 0 w 1639767"/>
+                  <a:gd name="connsiteY10" fmla="*/ 742474 h 4167358"/>
+                  <a:gd name="connsiteX11" fmla="*/ 0 w 1639767"/>
+                  <a:gd name="connsiteY11" fmla="*/ 1986 h 4167358"/>
+                </a:gdLst>
+                <a:ahLst/>
+                <a:cxnLst>
+                  <a:cxn ang="0">
+                    <a:pos x="connsiteX0" y="connsiteY0"/>
+                  </a:cxn>
+                  <a:cxn ang="0">
+                    <a:pos x="connsiteX1" y="connsiteY1"/>
+                  </a:cxn>
+                  <a:cxn ang="0">
+                    <a:pos x="connsiteX2" y="connsiteY2"/>
+                  </a:cxn>
+                  <a:cxn ang="0">
+                    <a:pos x="connsiteX3" y="connsiteY3"/>
+                  </a:cxn>
+                  <a:cxn ang="0">
+                    <a:pos x="connsiteX4" y="connsiteY4"/>
+                  </a:cxn>
+                  <a:cxn ang="0">
+                    <a:pos x="connsiteX5" y="connsiteY5"/>
+                  </a:cxn>
+                  <a:cxn ang="0">
+                    <a:pos x="connsiteX6" y="connsiteY6"/>
+                  </a:cxn>
+                  <a:cxn ang="0">
+                    <a:pos x="connsiteX7" y="connsiteY7"/>
+                  </a:cxn>
+                  <a:cxn ang="0">
+                    <a:pos x="connsiteX8" y="connsiteY8"/>
+                  </a:cxn>
+                  <a:cxn ang="0">
+                    <a:pos x="connsiteX9" y="connsiteY9"/>
+                  </a:cxn>
+                  <a:cxn ang="0">
+                    <a:pos x="connsiteX10" y="connsiteY10"/>
+                  </a:cxn>
+                  <a:cxn ang="0">
+                    <a:pos x="connsiteX11" y="connsiteY11"/>
+                  </a:cxn>
+                </a:cxnLst>
+                <a:rect l="l" t="t" r="r" b="b"/>
+                <a:pathLst>
+                  <a:path w="1639767" h="4167358">
+                    <a:moveTo>
+                      <a:pt x="448876" y="0"/>
+                    </a:moveTo>
+                    <a:cubicBezTo>
+                      <a:pt x="1024225" y="8313"/>
+                      <a:pt x="1371600" y="147870"/>
+                      <a:pt x="1521229" y="598528"/>
+                    </a:cubicBezTo>
+                    <a:cubicBezTo>
+                      <a:pt x="1670858" y="1109262"/>
+                      <a:pt x="1687484" y="3041471"/>
+                      <a:pt x="1521229" y="3577143"/>
+                    </a:cubicBezTo>
+                    <a:cubicBezTo>
+                      <a:pt x="1330036" y="4119240"/>
+                      <a:pt x="1032537" y="4142420"/>
+                      <a:pt x="465501" y="4167358"/>
+                    </a:cubicBezTo>
+                    <a:lnTo>
+                      <a:pt x="0" y="4167358"/>
+                    </a:lnTo>
+                    <a:lnTo>
+                      <a:pt x="0" y="3425864"/>
+                    </a:lnTo>
+                    <a:lnTo>
+                      <a:pt x="232195" y="3425864"/>
+                    </a:lnTo>
+                    <a:cubicBezTo>
+                      <a:pt x="597447" y="3409801"/>
+                      <a:pt x="789078" y="3394869"/>
+                      <a:pt x="912234" y="3045682"/>
+                    </a:cubicBezTo>
+                    <a:cubicBezTo>
+                      <a:pt x="1019326" y="2700633"/>
+                      <a:pt x="1008616" y="1456016"/>
+                      <a:pt x="912234" y="1127031"/>
+                    </a:cubicBezTo>
+                    <a:cubicBezTo>
+                      <a:pt x="815852" y="836743"/>
+                      <a:pt x="592093" y="746849"/>
+                      <a:pt x="221487" y="741494"/>
+                    </a:cubicBezTo>
+                    <a:lnTo>
+                      <a:pt x="0" y="742474"/>
+                    </a:lnTo>
+                    <a:lnTo>
+                      <a:pt x="0" y="1986"/>
+                    </a:lnTo>
+                    <a:close/>
+                  </a:path>
+                </a:pathLst>
+              </a:custGeom>
+              <a:grpFill/>
+              <a:ln>
+                <a:noFill/>
+              </a:ln>
+              <a:effectLst/>
+            </p:spPr>
+            <p:style>
+              <a:lnRef idx="2">
+                <a:schemeClr val="accent1">
+                  <a:shade val="50000"/>
+                </a:schemeClr>
+              </a:lnRef>
+              <a:fillRef idx="1">
+                <a:schemeClr val="accent1"/>
+              </a:fillRef>
+              <a:effectRef idx="0">
+                <a:schemeClr val="accent1"/>
+              </a:effectRef>
+              <a:fontRef idx="minor">
+                <a:schemeClr val="lt1"/>
+              </a:fontRef>
+            </p:style>
+            <p:txBody>
+              <a:bodyPr wrap="square" rtlCol="0" anchor="ctr">
+                <a:noAutofit/>
+              </a:bodyPr>
+              <a:lstStyle/>
+              <a:p>
+                <a:pPr algn="ctr"/>
+                <a:endParaRPr lang="ko-KR" altLang="en-US"/>
+              </a:p>
+            </p:txBody>
+          </p:sp>
+        </p:grpSp>
+        <p:sp>
+          <p:nvSpPr>
+            <p:cNvPr id="63" name="사각형: 둥근 모서리 62">
+              <a:extLst>
+                <a:ext uri="{FF2B5EF4-FFF2-40B4-BE49-F238E27FC236}">
+                  <a16:creationId xmlns:a16="http://schemas.microsoft.com/office/drawing/2014/main" id="{C4E46990-A861-4932-A739-EBA34A954CB9}"/>
+                </a:ext>
+              </a:extLst>
+            </p:cNvPr>
+            <p:cNvSpPr/>
+            <p:nvPr/>
+          </p:nvSpPr>
+          <p:spPr>
+            <a:xfrm>
+              <a:off x="832895" y="808517"/>
+              <a:ext cx="2324715" cy="2324715"/>
+            </a:xfrm>
+            <a:prstGeom prst="roundRect">
+              <a:avLst/>
+            </a:prstGeom>
+            <a:noFill/>
+            <a:ln>
+              <a:noFill/>
+            </a:ln>
+            <a:effectLst/>
+          </p:spPr>
+          <p:style>
+            <a:lnRef idx="2">
+              <a:schemeClr val="accent1">
+                <a:shade val="50000"/>
+              </a:schemeClr>
+            </a:lnRef>
+            <a:fillRef idx="1">
+              <a:schemeClr val="accent1"/>
+            </a:fillRef>
+            <a:effectRef idx="0">
+              <a:schemeClr val="accent1"/>
+            </a:effectRef>
+            <a:fontRef idx="minor">
+              <a:schemeClr val="lt1"/>
+            </a:fontRef>
+          </p:style>
+          <p:txBody>
+            <a:bodyPr rtlCol="0" anchor="ctr"/>
+            <a:lstStyle/>
+            <a:p>
+              <a:pPr algn="ctr"/>
+              <a:endParaRPr lang="ko-KR" altLang="en-US"/>
+            </a:p>
+          </p:txBody>
+        </p:sp>
+      </p:grpSp>
+    </p:spTree>
+    <p:extLst>
+      <p:ext uri="{BB962C8B-B14F-4D97-AF65-F5344CB8AC3E}">
+        <p14:creationId xmlns:p14="http://schemas.microsoft.com/office/powerpoint/2010/main" val="2061876933"/>
+      </p:ext>
+    </p:extLst>
+  </p:cSld>
+  <p:clrMapOvr>
+    <a:masterClrMapping/>
+  </p:clrMapOvr>
+</p:sld>
+</file>
+
+<file path=ppt/slides/slide3.xml><?xml version="1.0" encoding="utf-8"?>
+<p:sld xmlns:a="http://schemas.openxmlformats.org/drawingml/2006/main" xmlns:r="http://schemas.openxmlformats.org/officeDocument/2006/relationships" xmlns:p="http://schemas.openxmlformats.org/presentationml/2006/main">
+  <p:cSld>
+    <p:spTree>
+      <p:nvGrpSpPr>
+        <p:cNvPr id="1" name=""/>
+        <p:cNvGrpSpPr/>
+        <p:nvPr/>
+      </p:nvGrpSpPr>
+      <p:grpSpPr>
+        <a:xfrm>
+          <a:off x="0" y="0"/>
+          <a:ext cx="0" cy="0"/>
+          <a:chOff x="0" y="0"/>
+          <a:chExt cx="0" cy="0"/>
+        </a:xfrm>
+      </p:grpSpPr>
+      <p:sp>
+        <p:nvSpPr>
+          <p:cNvPr id="5" name="직사각형 4">
+            <a:extLst>
+              <a:ext uri="{FF2B5EF4-FFF2-40B4-BE49-F238E27FC236}">
+                <a16:creationId xmlns:a16="http://schemas.microsoft.com/office/drawing/2014/main" id="{529AD9CC-E1A5-4B92-B3C9-B53AA6BF5188}"/>
+              </a:ext>
+            </a:extLst>
+          </p:cNvPr>
+          <p:cNvSpPr/>
+          <p:nvPr/>
+        </p:nvSpPr>
+        <p:spPr>
+          <a:xfrm>
+            <a:off x="-5715000" y="-2286000"/>
+            <a:ext cx="23622000" cy="11430000"/>
+          </a:xfrm>
+          <a:prstGeom prst="rect">
+            <a:avLst/>
+          </a:prstGeom>
+          <a:solidFill>
+            <a:srgbClr val="2F71E9"/>
+          </a:solidFill>
+          <a:ln>
+            <a:noFill/>
+          </a:ln>
+        </p:spPr>
+        <p:style>
+          <a:lnRef idx="2">
+            <a:schemeClr val="accent1">
+              <a:shade val="50000"/>
+            </a:schemeClr>
+          </a:lnRef>
+          <a:fillRef idx="1">
+            <a:schemeClr val="accent1"/>
+          </a:fillRef>
+          <a:effectRef idx="0">
+            <a:schemeClr val="accent1"/>
+          </a:effectRef>
+          <a:fontRef idx="minor">
+            <a:schemeClr val="lt1"/>
+          </a:fontRef>
+        </p:style>
+        <p:txBody>
+          <a:bodyPr rtlCol="0" anchor="ctr"/>
+          <a:lstStyle/>
+          <a:p>
+            <a:pPr algn="ctr"/>
+            <a:endParaRPr lang="ko-KR" altLang="en-US" dirty="0"/>
+          </a:p>
+        </p:txBody>
+      </p:sp>
+      <p:grpSp>
+        <p:nvGrpSpPr>
+          <p:cNvPr id="6" name="그룹 5">
+            <a:extLst>
+              <a:ext uri="{FF2B5EF4-FFF2-40B4-BE49-F238E27FC236}">
+                <a16:creationId xmlns:a16="http://schemas.microsoft.com/office/drawing/2014/main" id="{90F71A5A-BCFD-44F4-BF4F-962E5C8C8FD9}"/>
+              </a:ext>
+            </a:extLst>
+          </p:cNvPr>
+          <p:cNvGrpSpPr/>
+          <p:nvPr/>
+        </p:nvGrpSpPr>
+        <p:grpSpPr>
+          <a:xfrm>
+            <a:off x="4699097" y="2032097"/>
+            <a:ext cx="2793806" cy="2793806"/>
+            <a:chOff x="832895" y="808517"/>
+            <a:chExt cx="2324715" cy="2324715"/>
+          </a:xfrm>
+        </p:grpSpPr>
+        <p:grpSp>
+          <p:nvGrpSpPr>
+            <p:cNvPr id="7" name="그룹 6">
+              <a:extLst>
+                <a:ext uri="{FF2B5EF4-FFF2-40B4-BE49-F238E27FC236}">
+                  <a16:creationId xmlns:a16="http://schemas.microsoft.com/office/drawing/2014/main" id="{DBB0D483-3B2F-4F8E-9476-090BF77FE980}"/>
+                </a:ext>
+              </a:extLst>
+            </p:cNvPr>
+            <p:cNvGrpSpPr/>
+            <p:nvPr/>
+          </p:nvGrpSpPr>
+          <p:grpSpPr>
+            <a:xfrm>
+              <a:off x="1369870" y="960607"/>
+              <a:ext cx="1428518" cy="2020534"/>
+              <a:chOff x="2288258" y="1445342"/>
+              <a:chExt cx="2940448" cy="4159045"/>
+            </a:xfrm>
+            <a:solidFill>
+              <a:schemeClr val="bg1"/>
+            </a:solidFill>
+            <a:effectLst>
+              <a:outerShdw blurRad="76200" dist="50800" dir="8100000" algn="t" rotWithShape="0">
+                <a:prstClr val="black">
+                  <a:alpha val="40000"/>
+                </a:prstClr>
+              </a:outerShdw>
+            </a:effectLst>
+          </p:grpSpPr>
+          <p:sp>
+            <p:nvSpPr>
+              <p:cNvPr id="9" name="직사각형 8">
+                <a:extLst>
+                  <a:ext uri="{FF2B5EF4-FFF2-40B4-BE49-F238E27FC236}">
+                    <a16:creationId xmlns:a16="http://schemas.microsoft.com/office/drawing/2014/main" id="{F22ACC7D-7ED6-48F1-9D80-0D55762DD03E}"/>
+                  </a:ext>
+                </a:extLst>
+              </p:cNvPr>
+              <p:cNvSpPr/>
+              <p:nvPr/>
+            </p:nvSpPr>
+            <p:spPr>
+              <a:xfrm>
+                <a:off x="2288258" y="1445342"/>
+                <a:ext cx="762223" cy="4159045"/>
+              </a:xfrm>
+              <a:prstGeom prst="rect">
+                <a:avLst/>
+              </a:prstGeom>
+              <a:grpFill/>
+              <a:ln>
+                <a:noFill/>
+              </a:ln>
+              <a:effectLst/>
+            </p:spPr>
+            <p:style>
+              <a:lnRef idx="2">
+                <a:schemeClr val="accent1">
+                  <a:shade val="50000"/>
+                </a:schemeClr>
+              </a:lnRef>
+              <a:fillRef idx="1">
+                <a:schemeClr val="accent1"/>
+              </a:fillRef>
+              <a:effectRef idx="0">
+                <a:schemeClr val="accent1"/>
+              </a:effectRef>
+              <a:fontRef idx="minor">
+                <a:schemeClr val="lt1"/>
+              </a:fontRef>
+            </p:style>
+            <p:txBody>
+              <a:bodyPr rtlCol="0" anchor="ctr"/>
+              <a:lstStyle/>
+              <a:p>
+                <a:pPr algn="ctr"/>
+                <a:endParaRPr lang="ko-KR" altLang="en-US"/>
+              </a:p>
+            </p:txBody>
+          </p:sp>
+          <p:sp>
+            <p:nvSpPr>
+              <p:cNvPr id="10" name="자유형: 도형 9">
+                <a:extLst>
+                  <a:ext uri="{FF2B5EF4-FFF2-40B4-BE49-F238E27FC236}">
+                    <a16:creationId xmlns:a16="http://schemas.microsoft.com/office/drawing/2014/main" id="{138FBF38-71A4-4F00-9E4D-4B75171C9170}"/>
+                  </a:ext>
+                </a:extLst>
+              </p:cNvPr>
+              <p:cNvSpPr/>
+              <p:nvPr/>
+            </p:nvSpPr>
+            <p:spPr>
+              <a:xfrm>
+                <a:off x="3333405" y="1445342"/>
+                <a:ext cx="1895301" cy="4159045"/>
+              </a:xfrm>
+              <a:custGeom>
+                <a:avLst/>
+                <a:gdLst>
+                  <a:gd name="connsiteX0" fmla="*/ 448876 w 1639767"/>
+                  <a:gd name="connsiteY0" fmla="*/ 0 h 4167358"/>
+                  <a:gd name="connsiteX1" fmla="*/ 1521229 w 1639767"/>
+                  <a:gd name="connsiteY1" fmla="*/ 598528 h 4167358"/>
+                  <a:gd name="connsiteX2" fmla="*/ 1521229 w 1639767"/>
+                  <a:gd name="connsiteY2" fmla="*/ 3577143 h 4167358"/>
+                  <a:gd name="connsiteX3" fmla="*/ 465501 w 1639767"/>
+                  <a:gd name="connsiteY3" fmla="*/ 4167358 h 4167358"/>
+                  <a:gd name="connsiteX4" fmla="*/ 0 w 1639767"/>
+                  <a:gd name="connsiteY4" fmla="*/ 4167358 h 4167358"/>
+                  <a:gd name="connsiteX5" fmla="*/ 0 w 1639767"/>
+                  <a:gd name="connsiteY5" fmla="*/ 3425864 h 4167358"/>
+                  <a:gd name="connsiteX6" fmla="*/ 232195 w 1639767"/>
+                  <a:gd name="connsiteY6" fmla="*/ 3425864 h 4167358"/>
+                  <a:gd name="connsiteX7" fmla="*/ 912234 w 1639767"/>
+                  <a:gd name="connsiteY7" fmla="*/ 3045682 h 4167358"/>
+                  <a:gd name="connsiteX8" fmla="*/ 912234 w 1639767"/>
+                  <a:gd name="connsiteY8" fmla="*/ 1127031 h 4167358"/>
+                  <a:gd name="connsiteX9" fmla="*/ 221487 w 1639767"/>
+                  <a:gd name="connsiteY9" fmla="*/ 741494 h 4167358"/>
+                  <a:gd name="connsiteX10" fmla="*/ 0 w 1639767"/>
+                  <a:gd name="connsiteY10" fmla="*/ 742474 h 4167358"/>
+                  <a:gd name="connsiteX11" fmla="*/ 0 w 1639767"/>
+                  <a:gd name="connsiteY11" fmla="*/ 1986 h 4167358"/>
+                </a:gdLst>
+                <a:ahLst/>
+                <a:cxnLst>
+                  <a:cxn ang="0">
+                    <a:pos x="connsiteX0" y="connsiteY0"/>
+                  </a:cxn>
+                  <a:cxn ang="0">
+                    <a:pos x="connsiteX1" y="connsiteY1"/>
+                  </a:cxn>
+                  <a:cxn ang="0">
+                    <a:pos x="connsiteX2" y="connsiteY2"/>
+                  </a:cxn>
+                  <a:cxn ang="0">
+                    <a:pos x="connsiteX3" y="connsiteY3"/>
+                  </a:cxn>
+                  <a:cxn ang="0">
+                    <a:pos x="connsiteX4" y="connsiteY4"/>
+                  </a:cxn>
+                  <a:cxn ang="0">
+                    <a:pos x="connsiteX5" y="connsiteY5"/>
+                  </a:cxn>
+                  <a:cxn ang="0">
+                    <a:pos x="connsiteX6" y="connsiteY6"/>
+                  </a:cxn>
+                  <a:cxn ang="0">
+                    <a:pos x="connsiteX7" y="connsiteY7"/>
+                  </a:cxn>
+                  <a:cxn ang="0">
+                    <a:pos x="connsiteX8" y="connsiteY8"/>
+                  </a:cxn>
+                  <a:cxn ang="0">
+                    <a:pos x="connsiteX9" y="connsiteY9"/>
+                  </a:cxn>
+                  <a:cxn ang="0">
+                    <a:pos x="connsiteX10" y="connsiteY10"/>
+                  </a:cxn>
+                  <a:cxn ang="0">
+                    <a:pos x="connsiteX11" y="connsiteY11"/>
+                  </a:cxn>
+                </a:cxnLst>
+                <a:rect l="l" t="t" r="r" b="b"/>
+                <a:pathLst>
+                  <a:path w="1639767" h="4167358">
+                    <a:moveTo>
+                      <a:pt x="448876" y="0"/>
+                    </a:moveTo>
+                    <a:cubicBezTo>
+                      <a:pt x="1024225" y="8313"/>
+                      <a:pt x="1371600" y="147870"/>
+                      <a:pt x="1521229" y="598528"/>
+                    </a:cubicBezTo>
+                    <a:cubicBezTo>
+                      <a:pt x="1670858" y="1109262"/>
+                      <a:pt x="1687484" y="3041471"/>
+                      <a:pt x="1521229" y="3577143"/>
+                    </a:cubicBezTo>
+                    <a:cubicBezTo>
+                      <a:pt x="1330036" y="4119240"/>
+                      <a:pt x="1032537" y="4142420"/>
+                      <a:pt x="465501" y="4167358"/>
+                    </a:cubicBezTo>
+                    <a:lnTo>
+                      <a:pt x="0" y="4167358"/>
+                    </a:lnTo>
+                    <a:lnTo>
+                      <a:pt x="0" y="3425864"/>
+                    </a:lnTo>
+                    <a:lnTo>
+                      <a:pt x="232195" y="3425864"/>
+                    </a:lnTo>
+                    <a:cubicBezTo>
+                      <a:pt x="597447" y="3409801"/>
+                      <a:pt x="789078" y="3394869"/>
+                      <a:pt x="912234" y="3045682"/>
+                    </a:cubicBezTo>
+                    <a:cubicBezTo>
+                      <a:pt x="1019326" y="2700633"/>
+                      <a:pt x="1008616" y="1456016"/>
+                      <a:pt x="912234" y="1127031"/>
+                    </a:cubicBezTo>
+                    <a:cubicBezTo>
+                      <a:pt x="815852" y="836743"/>
+                      <a:pt x="592093" y="746849"/>
+                      <a:pt x="221487" y="741494"/>
+                    </a:cubicBezTo>
+                    <a:lnTo>
+                      <a:pt x="0" y="742474"/>
+                    </a:lnTo>
+                    <a:lnTo>
+                      <a:pt x="0" y="1986"/>
+                    </a:lnTo>
+                    <a:close/>
+                  </a:path>
+                </a:pathLst>
+              </a:custGeom>
+              <a:grpFill/>
+              <a:ln>
+                <a:noFill/>
+              </a:ln>
+              <a:effectLst/>
+            </p:spPr>
+            <p:style>
+              <a:lnRef idx="2">
+                <a:schemeClr val="accent1">
+                  <a:shade val="50000"/>
+                </a:schemeClr>
+              </a:lnRef>
+              <a:fillRef idx="1">
+                <a:schemeClr val="accent1"/>
+              </a:fillRef>
+              <a:effectRef idx="0">
+                <a:schemeClr val="accent1"/>
+              </a:effectRef>
+              <a:fontRef idx="minor">
+                <a:schemeClr val="lt1"/>
+              </a:fontRef>
+            </p:style>
+            <p:txBody>
+              <a:bodyPr wrap="square" rtlCol="0" anchor="ctr">
+                <a:noAutofit/>
+              </a:bodyPr>
+              <a:lstStyle/>
+              <a:p>
+                <a:pPr algn="ctr"/>
+                <a:endParaRPr lang="ko-KR" altLang="en-US"/>
+              </a:p>
+            </p:txBody>
+          </p:sp>
+        </p:grpSp>
+        <p:sp>
+          <p:nvSpPr>
+            <p:cNvPr id="8" name="사각형: 둥근 모서리 7">
+              <a:extLst>
+                <a:ext uri="{FF2B5EF4-FFF2-40B4-BE49-F238E27FC236}">
+                  <a16:creationId xmlns:a16="http://schemas.microsoft.com/office/drawing/2014/main" id="{6F677D4C-C5F7-4F39-A37D-C8B7591C4463}"/>
+                </a:ext>
+              </a:extLst>
+            </p:cNvPr>
+            <p:cNvSpPr/>
+            <p:nvPr/>
+          </p:nvSpPr>
+          <p:spPr>
+            <a:xfrm>
+              <a:off x="832895" y="808517"/>
+              <a:ext cx="2324715" cy="2324715"/>
+            </a:xfrm>
+            <a:prstGeom prst="roundRect">
+              <a:avLst/>
+            </a:prstGeom>
+            <a:noFill/>
+            <a:ln>
+              <a:noFill/>
+            </a:ln>
+            <a:effectLst/>
+          </p:spPr>
+          <p:style>
+            <a:lnRef idx="2">
+              <a:schemeClr val="accent1">
+                <a:shade val="50000"/>
+              </a:schemeClr>
+            </a:lnRef>
+            <a:fillRef idx="1">
+              <a:schemeClr val="accent1"/>
+            </a:fillRef>
+            <a:effectRef idx="0">
+              <a:schemeClr val="accent1"/>
+            </a:effectRef>
+            <a:fontRef idx="minor">
+              <a:schemeClr val="lt1"/>
+            </a:fontRef>
+          </p:style>
+          <p:txBody>
+            <a:bodyPr rtlCol="0" anchor="ctr"/>
+            <a:lstStyle/>
+            <a:p>
+              <a:pPr algn="ctr"/>
+              <a:endParaRPr lang="ko-KR" altLang="en-US"/>
+            </a:p>
+          </p:txBody>
+        </p:sp>
+      </p:grpSp>
+      <p:sp>
+        <p:nvSpPr>
+          <p:cNvPr id="11" name="TextBox 10">
+            <a:extLst>
+              <a:ext uri="{FF2B5EF4-FFF2-40B4-BE49-F238E27FC236}">
+                <a16:creationId xmlns:a16="http://schemas.microsoft.com/office/drawing/2014/main" id="{E317068B-6C50-42EC-A123-5B464553DE30}"/>
+              </a:ext>
+            </a:extLst>
+          </p:cNvPr>
+          <p:cNvSpPr txBox="1"/>
+          <p:nvPr/>
+        </p:nvSpPr>
+        <p:spPr>
+          <a:xfrm>
+            <a:off x="5321624" y="-2931387"/>
+            <a:ext cx="1548758" cy="369332"/>
+          </a:xfrm>
+          <a:prstGeom prst="rect">
+            <a:avLst/>
+          </a:prstGeom>
+          <a:noFill/>
+        </p:spPr>
+        <p:txBody>
+          <a:bodyPr wrap="none" rtlCol="0">
+            <a:spAutoFit/>
+          </a:bodyPr>
+          <a:lstStyle/>
+          <a:p>
+            <a:pPr algn="ctr"/>
+            <a:r>
+              <a:rPr lang="en-US" altLang="ko-KR" dirty="0" err="1"/>
+              <a:t>SplashScreen</a:t>
+            </a:r>
+            <a:endParaRPr lang="ko-KR" altLang="en-US" dirty="0"/>
+          </a:p>
+        </p:txBody>
+      </p:sp>
+    </p:spTree>
+    <p:extLst>
+      <p:ext uri="{BB962C8B-B14F-4D97-AF65-F5344CB8AC3E}">
+        <p14:creationId xmlns:p14="http://schemas.microsoft.com/office/powerpoint/2010/main" val="535844711"/>
       </p:ext>
     </p:extLst>
   </p:cSld>

</xml_diff>